<commit_message>
Add agile methodology documentation to project repo with a link on readme file to raw data
</commit_message>
<xml_diff>
--- a/media/agile_methodology/Diners-3Star-Restaurant_project_Scoping.pptx
+++ b/media/agile_methodology/Diners-3Star-Restaurant_project_Scoping.pptx
@@ -13,14 +13,9 @@
     <p:sldId id="257" r:id="rId7"/>
     <p:sldId id="259" r:id="rId8"/>
     <p:sldId id="263" r:id="rId9"/>
-    <p:sldId id="266" r:id="rId10"/>
-    <p:sldId id="267" r:id="rId11"/>
-    <p:sldId id="268" r:id="rId12"/>
-    <p:sldId id="272" r:id="rId13"/>
-    <p:sldId id="269" r:id="rId14"/>
-    <p:sldId id="271" r:id="rId15"/>
-    <p:sldId id="265" r:id="rId16"/>
-    <p:sldId id="270" r:id="rId17"/>
+    <p:sldId id="268" r:id="rId10"/>
+    <p:sldId id="272" r:id="rId11"/>
+    <p:sldId id="271" r:id="rId12"/>
   </p:sldIdLst>
   <p:sldSz cx="12192000" cy="6858000"/>
   <p:notesSz cx="6858000" cy="9144000"/>
@@ -3607,1026 +3602,12 @@
           <a:p>
             <a:r>
               <a:rPr lang="en-GB" dirty="0"/>
-              <a:t>Database requirement assessment</a:t>
+              <a:t>Entity Relationship Diagrams</a:t>
             </a:r>
             <a:endParaRPr lang="pt-PT" dirty="0"/>
           </a:p>
         </p:txBody>
       </p:sp>
-      <p:sp>
-        <p:nvSpPr>
-          <p:cNvPr id="7" name="TextBox 6">
-            <a:extLst>
-              <a:ext uri="{FF2B5EF4-FFF2-40B4-BE49-F238E27FC236}">
-                <a16:creationId xmlns:a16="http://schemas.microsoft.com/office/drawing/2014/main" id="{FC98DAC8-6460-4CB6-97A0-882BE595AE77}"/>
-              </a:ext>
-            </a:extLst>
-          </p:cNvPr>
-          <p:cNvSpPr txBox="1"/>
-          <p:nvPr/>
-        </p:nvSpPr>
-        <p:spPr>
-          <a:xfrm>
-            <a:off x="3415339" y="927074"/>
-            <a:ext cx="5361319" cy="369332"/>
-          </a:xfrm>
-          <a:prstGeom prst="rect">
-            <a:avLst/>
-          </a:prstGeom>
-          <a:noFill/>
-        </p:spPr>
-        <p:txBody>
-          <a:bodyPr wrap="square" rtlCol="0">
-            <a:spAutoFit/>
-          </a:bodyPr>
-          <a:lstStyle/>
-          <a:p>
-            <a:r>
-              <a:rPr lang="en-GB" dirty="0"/>
-              <a:t>Navbar – No </a:t>
-            </a:r>
-            <a:r>
-              <a:rPr lang="en-GB" dirty="0" err="1"/>
-              <a:t>db</a:t>
-            </a:r>
-            <a:r>
-              <a:rPr lang="en-GB" dirty="0"/>
-              <a:t> required(Just HTML &amp; CSS &amp; JQuery)</a:t>
-            </a:r>
-            <a:endParaRPr lang="pt-PT" dirty="0"/>
-          </a:p>
-        </p:txBody>
-      </p:sp>
-      <p:pic>
-        <p:nvPicPr>
-          <p:cNvPr id="8" name="Picture 7">
-            <a:extLst>
-              <a:ext uri="{FF2B5EF4-FFF2-40B4-BE49-F238E27FC236}">
-                <a16:creationId xmlns:a16="http://schemas.microsoft.com/office/drawing/2014/main" id="{D061A141-C03F-43FF-A79F-6F3E7714D8A3}"/>
-              </a:ext>
-            </a:extLst>
-          </p:cNvPr>
-          <p:cNvPicPr>
-            <a:picLocks noChangeAspect="1"/>
-          </p:cNvPicPr>
-          <p:nvPr/>
-        </p:nvPicPr>
-        <p:blipFill>
-          <a:blip r:embed="rId2"/>
-          <a:stretch>
-            <a:fillRect/>
-          </a:stretch>
-        </p:blipFill>
-        <p:spPr>
-          <a:xfrm>
-            <a:off x="2476891" y="1585126"/>
-            <a:ext cx="7238213" cy="4094233"/>
-          </a:xfrm>
-          <a:prstGeom prst="rect">
-            <a:avLst/>
-          </a:prstGeom>
-        </p:spPr>
-      </p:pic>
-    </p:spTree>
-    <p:extLst>
-      <p:ext uri="{BB962C8B-B14F-4D97-AF65-F5344CB8AC3E}">
-        <p14:creationId xmlns:p14="http://schemas.microsoft.com/office/powerpoint/2010/main" val="3985926307"/>
-      </p:ext>
-    </p:extLst>
-  </p:cSld>
-  <p:clrMapOvr>
-    <a:masterClrMapping/>
-  </p:clrMapOvr>
-</p:sld>
-</file>
-
-<file path=ppt/slides/slide11.xml><?xml version="1.0" encoding="utf-8"?>
-<p:sld xmlns:a="http://schemas.openxmlformats.org/drawingml/2006/main" xmlns:r="http://schemas.openxmlformats.org/officeDocument/2006/relationships" xmlns:p="http://schemas.openxmlformats.org/presentationml/2006/main">
-  <p:cSld>
-    <p:spTree>
-      <p:nvGrpSpPr>
-        <p:cNvPr id="1" name=""/>
-        <p:cNvGrpSpPr/>
-        <p:nvPr/>
-      </p:nvGrpSpPr>
-      <p:grpSpPr>
-        <a:xfrm>
-          <a:off x="0" y="0"/>
-          <a:ext cx="0" cy="0"/>
-          <a:chOff x="0" y="0"/>
-          <a:chExt cx="0" cy="0"/>
-        </a:xfrm>
-      </p:grpSpPr>
-      <p:sp>
-        <p:nvSpPr>
-          <p:cNvPr id="4" name="TextBox 3">
-            <a:extLst>
-              <a:ext uri="{FF2B5EF4-FFF2-40B4-BE49-F238E27FC236}">
-                <a16:creationId xmlns:a16="http://schemas.microsoft.com/office/drawing/2014/main" id="{EA28F58D-AB73-4A24-9C34-6366C57093B6}"/>
-              </a:ext>
-            </a:extLst>
-          </p:cNvPr>
-          <p:cNvSpPr txBox="1"/>
-          <p:nvPr/>
-        </p:nvSpPr>
-        <p:spPr>
-          <a:xfrm>
-            <a:off x="4336211" y="405441"/>
-            <a:ext cx="3519577" cy="369332"/>
-          </a:xfrm>
-          <a:prstGeom prst="rect">
-            <a:avLst/>
-          </a:prstGeom>
-          <a:noFill/>
-        </p:spPr>
-        <p:txBody>
-          <a:bodyPr wrap="square" rtlCol="0">
-            <a:spAutoFit/>
-          </a:bodyPr>
-          <a:lstStyle/>
-          <a:p>
-            <a:r>
-              <a:rPr lang="en-GB" dirty="0"/>
-              <a:t>Database requirement assessment</a:t>
-            </a:r>
-            <a:endParaRPr lang="pt-PT" dirty="0"/>
-          </a:p>
-        </p:txBody>
-      </p:sp>
-      <p:sp>
-        <p:nvSpPr>
-          <p:cNvPr id="7" name="TextBox 6">
-            <a:extLst>
-              <a:ext uri="{FF2B5EF4-FFF2-40B4-BE49-F238E27FC236}">
-                <a16:creationId xmlns:a16="http://schemas.microsoft.com/office/drawing/2014/main" id="{FC98DAC8-6460-4CB6-97A0-882BE595AE77}"/>
-              </a:ext>
-            </a:extLst>
-          </p:cNvPr>
-          <p:cNvSpPr txBox="1"/>
-          <p:nvPr/>
-        </p:nvSpPr>
-        <p:spPr>
-          <a:xfrm>
-            <a:off x="4447993" y="894078"/>
-            <a:ext cx="3296012" cy="369332"/>
-          </a:xfrm>
-          <a:prstGeom prst="rect">
-            <a:avLst/>
-          </a:prstGeom>
-          <a:noFill/>
-        </p:spPr>
-        <p:txBody>
-          <a:bodyPr wrap="square" rtlCol="0">
-            <a:spAutoFit/>
-          </a:bodyPr>
-          <a:lstStyle/>
-          <a:p>
-            <a:r>
-              <a:rPr lang="en-GB" dirty="0"/>
-              <a:t>Registration Page – DB required</a:t>
-            </a:r>
-            <a:endParaRPr lang="pt-PT" dirty="0"/>
-          </a:p>
-        </p:txBody>
-      </p:sp>
-      <p:pic>
-        <p:nvPicPr>
-          <p:cNvPr id="3" name="Picture 2">
-            <a:extLst>
-              <a:ext uri="{FF2B5EF4-FFF2-40B4-BE49-F238E27FC236}">
-                <a16:creationId xmlns:a16="http://schemas.microsoft.com/office/drawing/2014/main" id="{D2213212-DBE0-445D-B69B-5180B421C07D}"/>
-              </a:ext>
-            </a:extLst>
-          </p:cNvPr>
-          <p:cNvPicPr>
-            <a:picLocks noChangeAspect="1"/>
-          </p:cNvPicPr>
-          <p:nvPr/>
-        </p:nvPicPr>
-        <p:blipFill>
-          <a:blip r:embed="rId2"/>
-          <a:stretch>
-            <a:fillRect/>
-          </a:stretch>
-        </p:blipFill>
-        <p:spPr>
-          <a:xfrm>
-            <a:off x="2344621" y="1450124"/>
-            <a:ext cx="7502756" cy="4251937"/>
-          </a:xfrm>
-          <a:prstGeom prst="rect">
-            <a:avLst/>
-          </a:prstGeom>
-        </p:spPr>
-      </p:pic>
-      <p:graphicFrame>
-        <p:nvGraphicFramePr>
-          <p:cNvPr id="5" name="Table 5">
-            <a:extLst>
-              <a:ext uri="{FF2B5EF4-FFF2-40B4-BE49-F238E27FC236}">
-                <a16:creationId xmlns:a16="http://schemas.microsoft.com/office/drawing/2014/main" id="{BC22AAFA-ADD2-42AE-9A2B-A23D22A2489C}"/>
-              </a:ext>
-            </a:extLst>
-          </p:cNvPr>
-          <p:cNvGraphicFramePr>
-            <a:graphicFrameLocks noGrp="1"/>
-          </p:cNvGraphicFramePr>
-          <p:nvPr>
-            <p:extLst>
-              <p:ext uri="{D42A27DB-BD31-4B8C-83A1-F6EECF244321}">
-                <p14:modId xmlns:p14="http://schemas.microsoft.com/office/powerpoint/2010/main" val="2933594573"/>
-              </p:ext>
-            </p:extLst>
-          </p:nvPr>
-        </p:nvGraphicFramePr>
-        <p:xfrm>
-          <a:off x="112143" y="2647572"/>
-          <a:ext cx="3916393" cy="3968888"/>
-        </p:xfrm>
-        <a:graphic>
-          <a:graphicData uri="http://schemas.openxmlformats.org/drawingml/2006/table">
-            <a:tbl>
-              <a:tblPr firstRow="1" bandRow="1">
-                <a:tableStyleId>{5C22544A-7EE6-4342-B048-85BDC9FD1C3A}</a:tableStyleId>
-              </a:tblPr>
-              <a:tblGrid>
-                <a:gridCol w="1043797">
-                  <a:extLst>
-                    <a:ext uri="{9D8B030D-6E8A-4147-A177-3AD203B41FA5}">
-                      <a16:colId xmlns:a16="http://schemas.microsoft.com/office/drawing/2014/main" val="3851660792"/>
-                    </a:ext>
-                  </a:extLst>
-                </a:gridCol>
-                <a:gridCol w="1587260">
-                  <a:extLst>
-                    <a:ext uri="{9D8B030D-6E8A-4147-A177-3AD203B41FA5}">
-                      <a16:colId xmlns:a16="http://schemas.microsoft.com/office/drawing/2014/main" val="1609101764"/>
-                    </a:ext>
-                  </a:extLst>
-                </a:gridCol>
-                <a:gridCol w="1285336">
-                  <a:extLst>
-                    <a:ext uri="{9D8B030D-6E8A-4147-A177-3AD203B41FA5}">
-                      <a16:colId xmlns:a16="http://schemas.microsoft.com/office/drawing/2014/main" val="2893061827"/>
-                    </a:ext>
-                  </a:extLst>
-                </a:gridCol>
-              </a:tblGrid>
-              <a:tr h="566984">
-                <a:tc>
-                  <a:txBody>
-                    <a:bodyPr/>
-                    <a:lstStyle/>
-                    <a:p>
-                      <a:pPr algn="ctr"/>
-                      <a:r>
-                        <a:rPr lang="en-GB" sz="1400" dirty="0"/>
-                        <a:t>Key</a:t>
-                      </a:r>
-                      <a:endParaRPr lang="pt-PT" sz="1400" dirty="0"/>
-                    </a:p>
-                  </a:txBody>
-                  <a:tcPr anchor="ctr"/>
-                </a:tc>
-                <a:tc>
-                  <a:txBody>
-                    <a:bodyPr/>
-                    <a:lstStyle/>
-                    <a:p>
-                      <a:pPr algn="ctr"/>
-                      <a:r>
-                        <a:rPr lang="en-GB" sz="1400" dirty="0"/>
-                        <a:t>Name</a:t>
-                      </a:r>
-                      <a:endParaRPr lang="pt-PT" sz="1400" dirty="0"/>
-                    </a:p>
-                  </a:txBody>
-                  <a:tcPr anchor="ctr"/>
-                </a:tc>
-                <a:tc>
-                  <a:txBody>
-                    <a:bodyPr/>
-                    <a:lstStyle/>
-                    <a:p>
-                      <a:pPr algn="ctr"/>
-                      <a:r>
-                        <a:rPr lang="en-GB" sz="1400" dirty="0"/>
-                        <a:t>Type</a:t>
-                      </a:r>
-                      <a:endParaRPr lang="pt-PT" sz="1400" dirty="0"/>
-                    </a:p>
-                  </a:txBody>
-                  <a:tcPr anchor="ctr"/>
-                </a:tc>
-                <a:extLst>
-                  <a:ext uri="{0D108BD9-81ED-4DB2-BD59-A6C34878D82A}">
-                    <a16:rowId xmlns:a16="http://schemas.microsoft.com/office/drawing/2014/main" val="3993183463"/>
-                  </a:ext>
-                </a:extLst>
-              </a:tr>
-              <a:tr h="566984">
-                <a:tc>
-                  <a:txBody>
-                    <a:bodyPr/>
-                    <a:lstStyle/>
-                    <a:p>
-                      <a:pPr algn="ctr"/>
-                      <a:r>
-                        <a:rPr lang="en-GB" sz="1400" dirty="0" err="1"/>
-                        <a:t>ForeignKey</a:t>
-                      </a:r>
-                      <a:endParaRPr lang="pt-PT" sz="1400" dirty="0"/>
-                    </a:p>
-                  </a:txBody>
-                  <a:tcPr anchor="ctr"/>
-                </a:tc>
-                <a:tc>
-                  <a:txBody>
-                    <a:bodyPr/>
-                    <a:lstStyle/>
-                    <a:p>
-                      <a:pPr algn="ctr"/>
-                      <a:r>
-                        <a:rPr lang="en-GB" sz="1400" dirty="0"/>
-                        <a:t>Username</a:t>
-                      </a:r>
-                      <a:endParaRPr lang="pt-PT" sz="1400" dirty="0"/>
-                    </a:p>
-                  </a:txBody>
-                  <a:tcPr anchor="ctr"/>
-                </a:tc>
-                <a:tc>
-                  <a:txBody>
-                    <a:bodyPr/>
-                    <a:lstStyle/>
-                    <a:p>
-                      <a:pPr algn="ctr"/>
-                      <a:r>
-                        <a:rPr lang="en-GB" sz="1400" dirty="0"/>
-                        <a:t>User Model</a:t>
-                      </a:r>
-                      <a:endParaRPr lang="pt-PT" sz="1400" dirty="0"/>
-                    </a:p>
-                  </a:txBody>
-                  <a:tcPr anchor="ctr"/>
-                </a:tc>
-                <a:extLst>
-                  <a:ext uri="{0D108BD9-81ED-4DB2-BD59-A6C34878D82A}">
-                    <a16:rowId xmlns:a16="http://schemas.microsoft.com/office/drawing/2014/main" val="4279462268"/>
-                  </a:ext>
-                </a:extLst>
-              </a:tr>
-              <a:tr h="566984">
-                <a:tc>
-                  <a:txBody>
-                    <a:bodyPr/>
-                    <a:lstStyle/>
-                    <a:p>
-                      <a:pPr algn="ctr"/>
-                      <a:endParaRPr lang="pt-PT" sz="1400" dirty="0"/>
-                    </a:p>
-                  </a:txBody>
-                  <a:tcPr anchor="ctr"/>
-                </a:tc>
-                <a:tc>
-                  <a:txBody>
-                    <a:bodyPr/>
-                    <a:lstStyle/>
-                    <a:p>
-                      <a:pPr algn="ctr"/>
-                      <a:r>
-                        <a:rPr lang="en-GB" sz="1400" dirty="0"/>
-                        <a:t>First Name</a:t>
-                      </a:r>
-                      <a:endParaRPr lang="pt-PT" sz="1400" dirty="0"/>
-                    </a:p>
-                  </a:txBody>
-                  <a:tcPr anchor="ctr"/>
-                </a:tc>
-                <a:tc>
-                  <a:txBody>
-                    <a:bodyPr/>
-                    <a:lstStyle/>
-                    <a:p>
-                      <a:pPr algn="ctr"/>
-                      <a:r>
-                        <a:rPr lang="en-GB" sz="1400" dirty="0" err="1"/>
-                        <a:t>CharField</a:t>
-                      </a:r>
-                      <a:endParaRPr lang="en-GB" sz="1400" dirty="0"/>
-                    </a:p>
-                    <a:p>
-                      <a:pPr algn="ctr"/>
-                      <a:r>
-                        <a:rPr lang="en-GB" sz="1400" dirty="0"/>
-                        <a:t>(max 80)</a:t>
-                      </a:r>
-                      <a:endParaRPr lang="pt-PT" sz="1400" dirty="0"/>
-                    </a:p>
-                  </a:txBody>
-                  <a:tcPr anchor="ctr"/>
-                </a:tc>
-                <a:extLst>
-                  <a:ext uri="{0D108BD9-81ED-4DB2-BD59-A6C34878D82A}">
-                    <a16:rowId xmlns:a16="http://schemas.microsoft.com/office/drawing/2014/main" val="1127955345"/>
-                  </a:ext>
-                </a:extLst>
-              </a:tr>
-              <a:tr h="566984">
-                <a:tc>
-                  <a:txBody>
-                    <a:bodyPr/>
-                    <a:lstStyle/>
-                    <a:p>
-                      <a:pPr algn="ctr"/>
-                      <a:endParaRPr lang="pt-PT" sz="1400" dirty="0"/>
-                    </a:p>
-                  </a:txBody>
-                  <a:tcPr anchor="ctr"/>
-                </a:tc>
-                <a:tc>
-                  <a:txBody>
-                    <a:bodyPr/>
-                    <a:lstStyle/>
-                    <a:p>
-                      <a:pPr algn="ctr"/>
-                      <a:r>
-                        <a:rPr lang="en-GB" sz="1400" dirty="0"/>
-                        <a:t>Last Name</a:t>
-                      </a:r>
-                      <a:endParaRPr lang="pt-PT" sz="1400" dirty="0"/>
-                    </a:p>
-                  </a:txBody>
-                  <a:tcPr anchor="ctr"/>
-                </a:tc>
-                <a:tc>
-                  <a:txBody>
-                    <a:bodyPr/>
-                    <a:lstStyle/>
-                    <a:p>
-                      <a:pPr algn="ctr"/>
-                      <a:r>
-                        <a:rPr lang="en-GB" sz="1400" dirty="0" err="1"/>
-                        <a:t>CharField</a:t>
-                      </a:r>
-                      <a:endParaRPr lang="en-GB" sz="1400" dirty="0"/>
-                    </a:p>
-                    <a:p>
-                      <a:pPr algn="ctr"/>
-                      <a:r>
-                        <a:rPr lang="en-GB" sz="1400" dirty="0"/>
-                        <a:t>(max 80)</a:t>
-                      </a:r>
-                      <a:endParaRPr lang="pt-PT" sz="1400" dirty="0"/>
-                    </a:p>
-                  </a:txBody>
-                  <a:tcPr anchor="ctr"/>
-                </a:tc>
-                <a:extLst>
-                  <a:ext uri="{0D108BD9-81ED-4DB2-BD59-A6C34878D82A}">
-                    <a16:rowId xmlns:a16="http://schemas.microsoft.com/office/drawing/2014/main" val="3745660415"/>
-                  </a:ext>
-                </a:extLst>
-              </a:tr>
-              <a:tr h="566984">
-                <a:tc>
-                  <a:txBody>
-                    <a:bodyPr/>
-                    <a:lstStyle/>
-                    <a:p>
-                      <a:pPr algn="ctr"/>
-                      <a:endParaRPr lang="pt-PT" sz="1400" dirty="0"/>
-                    </a:p>
-                  </a:txBody>
-                  <a:tcPr anchor="ctr"/>
-                </a:tc>
-                <a:tc>
-                  <a:txBody>
-                    <a:bodyPr/>
-                    <a:lstStyle/>
-                    <a:p>
-                      <a:pPr algn="ctr"/>
-                      <a:r>
-                        <a:rPr lang="en-GB" sz="1400" dirty="0"/>
-                        <a:t>Email(Unique)</a:t>
-                      </a:r>
-                      <a:endParaRPr lang="pt-PT" sz="1400" dirty="0"/>
-                    </a:p>
-                  </a:txBody>
-                  <a:tcPr anchor="ctr"/>
-                </a:tc>
-                <a:tc>
-                  <a:txBody>
-                    <a:bodyPr/>
-                    <a:lstStyle/>
-                    <a:p>
-                      <a:pPr marL="0" marR="0" lvl="0" indent="0" algn="ctr" defTabSz="914400" rtl="0" eaLnBrk="1" fontAlgn="auto" latinLnBrk="0" hangingPunct="1">
-                        <a:lnSpc>
-                          <a:spcPct val="100000"/>
-                        </a:lnSpc>
-                        <a:spcBef>
-                          <a:spcPts val="0"/>
-                        </a:spcBef>
-                        <a:spcAft>
-                          <a:spcPts val="0"/>
-                        </a:spcAft>
-                        <a:buClrTx/>
-                        <a:buSzTx/>
-                        <a:buFontTx/>
-                        <a:buNone/>
-                        <a:tabLst/>
-                        <a:defRPr/>
-                      </a:pPr>
-                      <a:r>
-                        <a:rPr lang="en-GB" sz="1400" dirty="0" err="1"/>
-                        <a:t>EmailField</a:t>
-                      </a:r>
-                      <a:r>
-                        <a:rPr lang="en-GB" sz="1400" dirty="0"/>
-                        <a:t>()</a:t>
-                      </a:r>
-                      <a:endParaRPr lang="pt-PT" sz="1400" dirty="0"/>
-                    </a:p>
-                  </a:txBody>
-                  <a:tcPr anchor="ctr"/>
-                </a:tc>
-                <a:extLst>
-                  <a:ext uri="{0D108BD9-81ED-4DB2-BD59-A6C34878D82A}">
-                    <a16:rowId xmlns:a16="http://schemas.microsoft.com/office/drawing/2014/main" val="39442062"/>
-                  </a:ext>
-                </a:extLst>
-              </a:tr>
-              <a:tr h="566984">
-                <a:tc>
-                  <a:txBody>
-                    <a:bodyPr/>
-                    <a:lstStyle/>
-                    <a:p>
-                      <a:pPr algn="ctr"/>
-                      <a:endParaRPr lang="pt-PT" sz="1400"/>
-                    </a:p>
-                  </a:txBody>
-                  <a:tcPr anchor="ctr"/>
-                </a:tc>
-                <a:tc>
-                  <a:txBody>
-                    <a:bodyPr/>
-                    <a:lstStyle/>
-                    <a:p>
-                      <a:pPr algn="ctr"/>
-                      <a:r>
-                        <a:rPr lang="en-GB" sz="1400" dirty="0"/>
-                        <a:t>Contact(Unique)</a:t>
-                      </a:r>
-                      <a:endParaRPr lang="pt-PT" sz="1400" dirty="0"/>
-                    </a:p>
-                  </a:txBody>
-                  <a:tcPr anchor="ctr"/>
-                </a:tc>
-                <a:tc>
-                  <a:txBody>
-                    <a:bodyPr/>
-                    <a:lstStyle/>
-                    <a:p>
-                      <a:pPr marL="0" marR="0" lvl="0" indent="0" algn="ctr" defTabSz="914400" rtl="0" eaLnBrk="1" fontAlgn="auto" latinLnBrk="0" hangingPunct="1">
-                        <a:lnSpc>
-                          <a:spcPct val="100000"/>
-                        </a:lnSpc>
-                        <a:spcBef>
-                          <a:spcPts val="0"/>
-                        </a:spcBef>
-                        <a:spcAft>
-                          <a:spcPts val="0"/>
-                        </a:spcAft>
-                        <a:buClrTx/>
-                        <a:buSzTx/>
-                        <a:buFontTx/>
-                        <a:buNone/>
-                        <a:tabLst/>
-                        <a:defRPr/>
-                      </a:pPr>
-                      <a:r>
-                        <a:rPr lang="en-GB" sz="1400" dirty="0" err="1"/>
-                        <a:t>IntField</a:t>
-                      </a:r>
-                      <a:endParaRPr lang="pt-PT" sz="1400" dirty="0"/>
-                    </a:p>
-                  </a:txBody>
-                  <a:tcPr anchor="ctr"/>
-                </a:tc>
-                <a:extLst>
-                  <a:ext uri="{0D108BD9-81ED-4DB2-BD59-A6C34878D82A}">
-                    <a16:rowId xmlns:a16="http://schemas.microsoft.com/office/drawing/2014/main" val="3880644178"/>
-                  </a:ext>
-                </a:extLst>
-              </a:tr>
-              <a:tr h="566984">
-                <a:tc>
-                  <a:txBody>
-                    <a:bodyPr/>
-                    <a:lstStyle/>
-                    <a:p>
-                      <a:pPr algn="ctr"/>
-                      <a:endParaRPr lang="pt-PT" sz="1400" dirty="0"/>
-                    </a:p>
-                  </a:txBody>
-                  <a:tcPr anchor="ctr"/>
-                </a:tc>
-                <a:tc>
-                  <a:txBody>
-                    <a:bodyPr/>
-                    <a:lstStyle/>
-                    <a:p>
-                      <a:pPr algn="ctr"/>
-                      <a:r>
-                        <a:rPr lang="en-GB" sz="1400" dirty="0"/>
-                        <a:t>Slug(Unique)</a:t>
-                      </a:r>
-                      <a:endParaRPr lang="pt-PT" sz="1400" dirty="0"/>
-                    </a:p>
-                  </a:txBody>
-                  <a:tcPr anchor="ctr"/>
-                </a:tc>
-                <a:tc>
-                  <a:txBody>
-                    <a:bodyPr/>
-                    <a:lstStyle/>
-                    <a:p>
-                      <a:pPr marL="0" marR="0" lvl="0" indent="0" algn="ctr" defTabSz="914400" rtl="0" eaLnBrk="1" fontAlgn="auto" latinLnBrk="0" hangingPunct="1">
-                        <a:lnSpc>
-                          <a:spcPct val="100000"/>
-                        </a:lnSpc>
-                        <a:spcBef>
-                          <a:spcPts val="0"/>
-                        </a:spcBef>
-                        <a:spcAft>
-                          <a:spcPts val="0"/>
-                        </a:spcAft>
-                        <a:buClrTx/>
-                        <a:buSzTx/>
-                        <a:buFontTx/>
-                        <a:buNone/>
-                        <a:tabLst/>
-                        <a:defRPr/>
-                      </a:pPr>
-                      <a:r>
-                        <a:rPr lang="en-GB" sz="1400" dirty="0" err="1"/>
-                        <a:t>SlugField</a:t>
-                      </a:r>
-                      <a:endParaRPr lang="pt-PT" sz="1400" dirty="0"/>
-                    </a:p>
-                  </a:txBody>
-                  <a:tcPr anchor="ctr"/>
-                </a:tc>
-                <a:extLst>
-                  <a:ext uri="{0D108BD9-81ED-4DB2-BD59-A6C34878D82A}">
-                    <a16:rowId xmlns:a16="http://schemas.microsoft.com/office/drawing/2014/main" val="2450656954"/>
-                  </a:ext>
-                </a:extLst>
-              </a:tr>
-            </a:tbl>
-          </a:graphicData>
-        </a:graphic>
-      </p:graphicFrame>
-    </p:spTree>
-    <p:extLst>
-      <p:ext uri="{BB962C8B-B14F-4D97-AF65-F5344CB8AC3E}">
-        <p14:creationId xmlns:p14="http://schemas.microsoft.com/office/powerpoint/2010/main" val="2337255865"/>
-      </p:ext>
-    </p:extLst>
-  </p:cSld>
-  <p:clrMapOvr>
-    <a:masterClrMapping/>
-  </p:clrMapOvr>
-</p:sld>
-</file>
-
-<file path=ppt/slides/slide12.xml><?xml version="1.0" encoding="utf-8"?>
-<p:sld xmlns:a="http://schemas.openxmlformats.org/drawingml/2006/main" xmlns:r="http://schemas.openxmlformats.org/officeDocument/2006/relationships" xmlns:p="http://schemas.openxmlformats.org/presentationml/2006/main">
-  <p:cSld>
-    <p:spTree>
-      <p:nvGrpSpPr>
-        <p:cNvPr id="1" name=""/>
-        <p:cNvGrpSpPr/>
-        <p:nvPr/>
-      </p:nvGrpSpPr>
-      <p:grpSpPr>
-        <a:xfrm>
-          <a:off x="0" y="0"/>
-          <a:ext cx="0" cy="0"/>
-          <a:chOff x="0" y="0"/>
-          <a:chExt cx="0" cy="0"/>
-        </a:xfrm>
-      </p:grpSpPr>
-      <p:sp>
-        <p:nvSpPr>
-          <p:cNvPr id="4" name="TextBox 3">
-            <a:extLst>
-              <a:ext uri="{FF2B5EF4-FFF2-40B4-BE49-F238E27FC236}">
-                <a16:creationId xmlns:a16="http://schemas.microsoft.com/office/drawing/2014/main" id="{EA28F58D-AB73-4A24-9C34-6366C57093B6}"/>
-              </a:ext>
-            </a:extLst>
-          </p:cNvPr>
-          <p:cNvSpPr txBox="1"/>
-          <p:nvPr/>
-        </p:nvSpPr>
-        <p:spPr>
-          <a:xfrm>
-            <a:off x="4336211" y="405441"/>
-            <a:ext cx="3519577" cy="369332"/>
-          </a:xfrm>
-          <a:prstGeom prst="rect">
-            <a:avLst/>
-          </a:prstGeom>
-          <a:noFill/>
-        </p:spPr>
-        <p:txBody>
-          <a:bodyPr wrap="square" rtlCol="0">
-            <a:spAutoFit/>
-          </a:bodyPr>
-          <a:lstStyle/>
-          <a:p>
-            <a:r>
-              <a:rPr lang="en-GB" dirty="0"/>
-              <a:t>Database requirement assessment</a:t>
-            </a:r>
-            <a:endParaRPr lang="pt-PT" dirty="0"/>
-          </a:p>
-        </p:txBody>
-      </p:sp>
-      <p:sp>
-        <p:nvSpPr>
-          <p:cNvPr id="7" name="TextBox 6">
-            <a:extLst>
-              <a:ext uri="{FF2B5EF4-FFF2-40B4-BE49-F238E27FC236}">
-                <a16:creationId xmlns:a16="http://schemas.microsoft.com/office/drawing/2014/main" id="{FC98DAC8-6460-4CB6-97A0-882BE595AE77}"/>
-              </a:ext>
-            </a:extLst>
-          </p:cNvPr>
-          <p:cNvSpPr txBox="1"/>
-          <p:nvPr/>
-        </p:nvSpPr>
-        <p:spPr>
-          <a:xfrm>
-            <a:off x="788958" y="124824"/>
-            <a:ext cx="2580019" cy="369332"/>
-          </a:xfrm>
-          <a:prstGeom prst="rect">
-            <a:avLst/>
-          </a:prstGeom>
-          <a:noFill/>
-        </p:spPr>
-        <p:txBody>
-          <a:bodyPr wrap="square" rtlCol="0">
-            <a:spAutoFit/>
-          </a:bodyPr>
-          <a:lstStyle/>
-          <a:p>
-            <a:r>
-              <a:rPr lang="en-GB" dirty="0"/>
-              <a:t>Table – 2 seats per table</a:t>
-            </a:r>
-            <a:endParaRPr lang="pt-PT" dirty="0"/>
-          </a:p>
-        </p:txBody>
-      </p:sp>
-      <p:graphicFrame>
-        <p:nvGraphicFramePr>
-          <p:cNvPr id="5" name="Table 5">
-            <a:extLst>
-              <a:ext uri="{FF2B5EF4-FFF2-40B4-BE49-F238E27FC236}">
-                <a16:creationId xmlns:a16="http://schemas.microsoft.com/office/drawing/2014/main" id="{102F3F05-9939-4DD5-BA9D-C8EB93F8716A}"/>
-              </a:ext>
-            </a:extLst>
-          </p:cNvPr>
-          <p:cNvGraphicFramePr>
-            <a:graphicFrameLocks noGrp="1"/>
-          </p:cNvGraphicFramePr>
-          <p:nvPr>
-            <p:extLst>
-              <p:ext uri="{D42A27DB-BD31-4B8C-83A1-F6EECF244321}">
-                <p14:modId xmlns:p14="http://schemas.microsoft.com/office/powerpoint/2010/main" val="867284016"/>
-              </p:ext>
-            </p:extLst>
-          </p:nvPr>
-        </p:nvGraphicFramePr>
-        <p:xfrm>
-          <a:off x="120772" y="749767"/>
-          <a:ext cx="3968151" cy="1257742"/>
-        </p:xfrm>
-        <a:graphic>
-          <a:graphicData uri="http://schemas.openxmlformats.org/drawingml/2006/table">
-            <a:tbl>
-              <a:tblPr firstRow="1" bandRow="1">
-                <a:tableStyleId>{5C22544A-7EE6-4342-B048-85BDC9FD1C3A}</a:tableStyleId>
-              </a:tblPr>
-              <a:tblGrid>
-                <a:gridCol w="1026544">
-                  <a:extLst>
-                    <a:ext uri="{9D8B030D-6E8A-4147-A177-3AD203B41FA5}">
-                      <a16:colId xmlns:a16="http://schemas.microsoft.com/office/drawing/2014/main" val="3851660792"/>
-                    </a:ext>
-                  </a:extLst>
-                </a:gridCol>
-                <a:gridCol w="862641">
-                  <a:extLst>
-                    <a:ext uri="{9D8B030D-6E8A-4147-A177-3AD203B41FA5}">
-                      <a16:colId xmlns:a16="http://schemas.microsoft.com/office/drawing/2014/main" val="1609101764"/>
-                    </a:ext>
-                  </a:extLst>
-                </a:gridCol>
-                <a:gridCol w="2078966">
-                  <a:extLst>
-                    <a:ext uri="{9D8B030D-6E8A-4147-A177-3AD203B41FA5}">
-                      <a16:colId xmlns:a16="http://schemas.microsoft.com/office/drawing/2014/main" val="2893061827"/>
-                    </a:ext>
-                  </a:extLst>
-                </a:gridCol>
-              </a:tblGrid>
-              <a:tr h="388920">
-                <a:tc>
-                  <a:txBody>
-                    <a:bodyPr/>
-                    <a:lstStyle/>
-                    <a:p>
-                      <a:pPr algn="ctr"/>
-                      <a:r>
-                        <a:rPr lang="en-GB" sz="1400" dirty="0"/>
-                        <a:t>Key</a:t>
-                      </a:r>
-                      <a:endParaRPr lang="pt-PT" sz="1400" dirty="0"/>
-                    </a:p>
-                  </a:txBody>
-                  <a:tcPr anchor="ctr"/>
-                </a:tc>
-                <a:tc>
-                  <a:txBody>
-                    <a:bodyPr/>
-                    <a:lstStyle/>
-                    <a:p>
-                      <a:pPr algn="ctr"/>
-                      <a:r>
-                        <a:rPr lang="en-GB" sz="1400" dirty="0"/>
-                        <a:t>Name</a:t>
-                      </a:r>
-                      <a:endParaRPr lang="pt-PT" sz="1400" dirty="0"/>
-                    </a:p>
-                  </a:txBody>
-                  <a:tcPr anchor="ctr"/>
-                </a:tc>
-                <a:tc>
-                  <a:txBody>
-                    <a:bodyPr/>
-                    <a:lstStyle/>
-                    <a:p>
-                      <a:pPr algn="ctr"/>
-                      <a:r>
-                        <a:rPr lang="en-GB" sz="1400" dirty="0"/>
-                        <a:t>Type</a:t>
-                      </a:r>
-                      <a:endParaRPr lang="pt-PT" sz="1400" dirty="0"/>
-                    </a:p>
-                  </a:txBody>
-                  <a:tcPr anchor="ctr"/>
-                </a:tc>
-                <a:extLst>
-                  <a:ext uri="{0D108BD9-81ED-4DB2-BD59-A6C34878D82A}">
-                    <a16:rowId xmlns:a16="http://schemas.microsoft.com/office/drawing/2014/main" val="3993183463"/>
-                  </a:ext>
-                </a:extLst>
-              </a:tr>
-              <a:tr h="434411">
-                <a:tc>
-                  <a:txBody>
-                    <a:bodyPr/>
-                    <a:lstStyle/>
-                    <a:p>
-                      <a:pPr marL="0" marR="0" lvl="0" indent="0" algn="ctr" defTabSz="914400" rtl="0" eaLnBrk="1" fontAlgn="auto" latinLnBrk="0" hangingPunct="1">
-                        <a:lnSpc>
-                          <a:spcPct val="100000"/>
-                        </a:lnSpc>
-                        <a:spcBef>
-                          <a:spcPts val="0"/>
-                        </a:spcBef>
-                        <a:spcAft>
-                          <a:spcPts val="0"/>
-                        </a:spcAft>
-                        <a:buClrTx/>
-                        <a:buSzTx/>
-                        <a:buFontTx/>
-                        <a:buNone/>
-                        <a:tabLst/>
-                        <a:defRPr/>
-                      </a:pPr>
-                      <a:r>
-                        <a:rPr lang="en-GB" sz="1400" dirty="0" err="1"/>
-                        <a:t>ForeignKey</a:t>
-                      </a:r>
-                      <a:endParaRPr lang="pt-PT" sz="1400" dirty="0"/>
-                    </a:p>
-                  </a:txBody>
-                  <a:tcPr anchor="ctr"/>
-                </a:tc>
-                <a:tc>
-                  <a:txBody>
-                    <a:bodyPr/>
-                    <a:lstStyle/>
-                    <a:p>
-                      <a:pPr algn="ctr"/>
-                      <a:r>
-                        <a:rPr lang="en-GB" sz="1400" dirty="0"/>
-                        <a:t>Table</a:t>
-                      </a:r>
-                      <a:endParaRPr lang="pt-PT" sz="1400" dirty="0"/>
-                    </a:p>
-                  </a:txBody>
-                  <a:tcPr anchor="ctr"/>
-                </a:tc>
-                <a:tc>
-                  <a:txBody>
-                    <a:bodyPr/>
-                    <a:lstStyle/>
-                    <a:p>
-                      <a:pPr algn="ctr"/>
-                      <a:r>
-                        <a:rPr lang="en-GB" sz="1400" dirty="0" err="1"/>
-                        <a:t>IntegerField</a:t>
-                      </a:r>
-                      <a:r>
-                        <a:rPr lang="en-GB" sz="1400" dirty="0"/>
-                        <a:t>()</a:t>
-                      </a:r>
-                      <a:endParaRPr lang="pt-PT" sz="1400" dirty="0"/>
-                    </a:p>
-                  </a:txBody>
-                  <a:tcPr anchor="ctr"/>
-                </a:tc>
-                <a:extLst>
-                  <a:ext uri="{0D108BD9-81ED-4DB2-BD59-A6C34878D82A}">
-                    <a16:rowId xmlns:a16="http://schemas.microsoft.com/office/drawing/2014/main" val="4279462268"/>
-                  </a:ext>
-                </a:extLst>
-              </a:tr>
-              <a:tr h="434411">
-                <a:tc>
-                  <a:txBody>
-                    <a:bodyPr/>
-                    <a:lstStyle/>
-                    <a:p>
-                      <a:pPr marL="0" marR="0" lvl="0" indent="0" algn="ctr" defTabSz="914400" rtl="0" eaLnBrk="1" fontAlgn="auto" latinLnBrk="0" hangingPunct="1">
-                        <a:lnSpc>
-                          <a:spcPct val="100000"/>
-                        </a:lnSpc>
-                        <a:spcBef>
-                          <a:spcPts val="0"/>
-                        </a:spcBef>
-                        <a:spcAft>
-                          <a:spcPts val="0"/>
-                        </a:spcAft>
-                        <a:buClrTx/>
-                        <a:buSzTx/>
-                        <a:buFontTx/>
-                        <a:buNone/>
-                        <a:tabLst/>
-                        <a:defRPr/>
-                      </a:pPr>
-                      <a:endParaRPr lang="pt-PT" sz="1400" dirty="0"/>
-                    </a:p>
-                  </a:txBody>
-                  <a:tcPr anchor="ctr"/>
-                </a:tc>
-                <a:tc>
-                  <a:txBody>
-                    <a:bodyPr/>
-                    <a:lstStyle/>
-                    <a:p>
-                      <a:pPr algn="ctr"/>
-                      <a:endParaRPr lang="pt-PT" sz="1400" dirty="0"/>
-                    </a:p>
-                  </a:txBody>
-                  <a:tcPr anchor="ctr"/>
-                </a:tc>
-                <a:tc>
-                  <a:txBody>
-                    <a:bodyPr/>
-                    <a:lstStyle/>
-                    <a:p>
-                      <a:pPr algn="ctr"/>
-                      <a:endParaRPr lang="pt-PT" sz="1400" dirty="0"/>
-                    </a:p>
-                  </a:txBody>
-                  <a:tcPr anchor="ctr"/>
-                </a:tc>
-                <a:extLst>
-                  <a:ext uri="{0D108BD9-81ED-4DB2-BD59-A6C34878D82A}">
-                    <a16:rowId xmlns:a16="http://schemas.microsoft.com/office/drawing/2014/main" val="1041435757"/>
-                  </a:ext>
-                </a:extLst>
-              </a:tr>
-            </a:tbl>
-          </a:graphicData>
-        </a:graphic>
-      </p:graphicFrame>
       <p:sp>
         <p:nvSpPr>
           <p:cNvPr id="6" name="TextBox 5">
@@ -5781,147 +4762,7 @@
 </p:sld>
 </file>
 
-<file path=ppt/slides/slide13.xml><?xml version="1.0" encoding="utf-8"?>
-<p:sld xmlns:a="http://schemas.openxmlformats.org/drawingml/2006/main" xmlns:r="http://schemas.openxmlformats.org/officeDocument/2006/relationships" xmlns:p="http://schemas.openxmlformats.org/presentationml/2006/main">
-  <p:cSld>
-    <p:spTree>
-      <p:nvGrpSpPr>
-        <p:cNvPr id="1" name=""/>
-        <p:cNvGrpSpPr/>
-        <p:nvPr/>
-      </p:nvGrpSpPr>
-      <p:grpSpPr>
-        <a:xfrm>
-          <a:off x="0" y="0"/>
-          <a:ext cx="0" cy="0"/>
-          <a:chOff x="0" y="0"/>
-          <a:chExt cx="0" cy="0"/>
-        </a:xfrm>
-      </p:grpSpPr>
-      <p:sp>
-        <p:nvSpPr>
-          <p:cNvPr id="4" name="TextBox 3">
-            <a:extLst>
-              <a:ext uri="{FF2B5EF4-FFF2-40B4-BE49-F238E27FC236}">
-                <a16:creationId xmlns:a16="http://schemas.microsoft.com/office/drawing/2014/main" id="{EA28F58D-AB73-4A24-9C34-6366C57093B6}"/>
-              </a:ext>
-            </a:extLst>
-          </p:cNvPr>
-          <p:cNvSpPr txBox="1"/>
-          <p:nvPr/>
-        </p:nvSpPr>
-        <p:spPr>
-          <a:xfrm>
-            <a:off x="4336211" y="405441"/>
-            <a:ext cx="3519577" cy="369332"/>
-          </a:xfrm>
-          <a:prstGeom prst="rect">
-            <a:avLst/>
-          </a:prstGeom>
-          <a:noFill/>
-        </p:spPr>
-        <p:txBody>
-          <a:bodyPr wrap="square" rtlCol="0">
-            <a:spAutoFit/>
-          </a:bodyPr>
-          <a:lstStyle/>
-          <a:p>
-            <a:r>
-              <a:rPr lang="en-GB" dirty="0"/>
-              <a:t>Database requirement assessment</a:t>
-            </a:r>
-            <a:endParaRPr lang="pt-PT" dirty="0"/>
-          </a:p>
-        </p:txBody>
-      </p:sp>
-      <p:sp>
-        <p:nvSpPr>
-          <p:cNvPr id="7" name="TextBox 6">
-            <a:extLst>
-              <a:ext uri="{FF2B5EF4-FFF2-40B4-BE49-F238E27FC236}">
-                <a16:creationId xmlns:a16="http://schemas.microsoft.com/office/drawing/2014/main" id="{FC98DAC8-6460-4CB6-97A0-882BE595AE77}"/>
-              </a:ext>
-            </a:extLst>
-          </p:cNvPr>
-          <p:cNvSpPr txBox="1"/>
-          <p:nvPr/>
-        </p:nvSpPr>
-        <p:spPr>
-          <a:xfrm>
-            <a:off x="3415339" y="927074"/>
-            <a:ext cx="5361319" cy="369332"/>
-          </a:xfrm>
-          <a:prstGeom prst="rect">
-            <a:avLst/>
-          </a:prstGeom>
-          <a:noFill/>
-        </p:spPr>
-        <p:txBody>
-          <a:bodyPr wrap="square" rtlCol="0">
-            <a:spAutoFit/>
-          </a:bodyPr>
-          <a:lstStyle/>
-          <a:p>
-            <a:r>
-              <a:rPr lang="en-GB" dirty="0"/>
-              <a:t>Navbar – No </a:t>
-            </a:r>
-            <a:r>
-              <a:rPr lang="en-GB" dirty="0" err="1"/>
-              <a:t>db</a:t>
-            </a:r>
-            <a:r>
-              <a:rPr lang="en-GB" dirty="0"/>
-              <a:t> required(Just HTML &amp; CSS &amp; JQuery)</a:t>
-            </a:r>
-            <a:endParaRPr lang="pt-PT" dirty="0"/>
-          </a:p>
-        </p:txBody>
-      </p:sp>
-      <p:pic>
-        <p:nvPicPr>
-          <p:cNvPr id="8" name="Picture 7">
-            <a:extLst>
-              <a:ext uri="{FF2B5EF4-FFF2-40B4-BE49-F238E27FC236}">
-                <a16:creationId xmlns:a16="http://schemas.microsoft.com/office/drawing/2014/main" id="{D061A141-C03F-43FF-A79F-6F3E7714D8A3}"/>
-              </a:ext>
-            </a:extLst>
-          </p:cNvPr>
-          <p:cNvPicPr>
-            <a:picLocks noChangeAspect="1"/>
-          </p:cNvPicPr>
-          <p:nvPr/>
-        </p:nvPicPr>
-        <p:blipFill>
-          <a:blip r:embed="rId2"/>
-          <a:stretch>
-            <a:fillRect/>
-          </a:stretch>
-        </p:blipFill>
-        <p:spPr>
-          <a:xfrm>
-            <a:off x="2476891" y="1585126"/>
-            <a:ext cx="7238213" cy="4094233"/>
-          </a:xfrm>
-          <a:prstGeom prst="rect">
-            <a:avLst/>
-          </a:prstGeom>
-        </p:spPr>
-      </p:pic>
-    </p:spTree>
-    <p:extLst>
-      <p:ext uri="{BB962C8B-B14F-4D97-AF65-F5344CB8AC3E}">
-        <p14:creationId xmlns:p14="http://schemas.microsoft.com/office/powerpoint/2010/main" val="1076336729"/>
-      </p:ext>
-    </p:extLst>
-  </p:cSld>
-  <p:clrMapOvr>
-    <a:masterClrMapping/>
-  </p:clrMapOvr>
-</p:sld>
-</file>
-
-<file path=ppt/slides/slide14.xml><?xml version="1.0" encoding="utf-8"?>
+<file path=ppt/slides/slide11.xml><?xml version="1.0" encoding="utf-8"?>
 <p:sld xmlns:a="http://schemas.openxmlformats.org/drawingml/2006/main" xmlns:r="http://schemas.openxmlformats.org/officeDocument/2006/relationships" xmlns:p="http://schemas.openxmlformats.org/presentationml/2006/main">
   <p:cSld>
     <p:spTree>
@@ -5972,272 +4813,6 @@
     <p:extLst>
       <p:ext uri="{BB962C8B-B14F-4D97-AF65-F5344CB8AC3E}">
         <p14:creationId xmlns:p14="http://schemas.microsoft.com/office/powerpoint/2010/main" val="3454158163"/>
-      </p:ext>
-    </p:extLst>
-  </p:cSld>
-  <p:clrMapOvr>
-    <a:masterClrMapping/>
-  </p:clrMapOvr>
-</p:sld>
-</file>
-
-<file path=ppt/slides/slide15.xml><?xml version="1.0" encoding="utf-8"?>
-<p:sld xmlns:a="http://schemas.openxmlformats.org/drawingml/2006/main" xmlns:r="http://schemas.openxmlformats.org/officeDocument/2006/relationships" xmlns:p="http://schemas.openxmlformats.org/presentationml/2006/main">
-  <p:cSld>
-    <p:spTree>
-      <p:nvGrpSpPr>
-        <p:cNvPr id="1" name=""/>
-        <p:cNvGrpSpPr/>
-        <p:nvPr/>
-      </p:nvGrpSpPr>
-      <p:grpSpPr>
-        <a:xfrm>
-          <a:off x="0" y="0"/>
-          <a:ext cx="0" cy="0"/>
-          <a:chOff x="0" y="0"/>
-          <a:chExt cx="0" cy="0"/>
-        </a:xfrm>
-      </p:grpSpPr>
-      <p:sp>
-        <p:nvSpPr>
-          <p:cNvPr id="8" name="TextBox 7">
-            <a:extLst>
-              <a:ext uri="{FF2B5EF4-FFF2-40B4-BE49-F238E27FC236}">
-                <a16:creationId xmlns:a16="http://schemas.microsoft.com/office/drawing/2014/main" id="{14AF8A88-6F5E-40EB-A7D7-0E45CF6CBE26}"/>
-              </a:ext>
-            </a:extLst>
-          </p:cNvPr>
-          <p:cNvSpPr txBox="1"/>
-          <p:nvPr/>
-        </p:nvSpPr>
-        <p:spPr>
-          <a:xfrm>
-            <a:off x="4481422" y="162989"/>
-            <a:ext cx="3229155" cy="369332"/>
-          </a:xfrm>
-          <a:prstGeom prst="rect">
-            <a:avLst/>
-          </a:prstGeom>
-          <a:noFill/>
-        </p:spPr>
-        <p:txBody>
-          <a:bodyPr wrap="square" rtlCol="0">
-            <a:spAutoFit/>
-          </a:bodyPr>
-          <a:lstStyle/>
-          <a:p>
-            <a:r>
-              <a:rPr lang="en-GB" dirty="0"/>
-              <a:t>Managing H10 errors on </a:t>
-            </a:r>
-            <a:r>
-              <a:rPr lang="en-GB" dirty="0" err="1"/>
-              <a:t>Keroku</a:t>
-            </a:r>
-            <a:endParaRPr lang="pt-PT" dirty="0"/>
-          </a:p>
-        </p:txBody>
-      </p:sp>
-      <p:pic>
-        <p:nvPicPr>
-          <p:cNvPr id="17" name="Picture 16">
-            <a:extLst>
-              <a:ext uri="{FF2B5EF4-FFF2-40B4-BE49-F238E27FC236}">
-                <a16:creationId xmlns:a16="http://schemas.microsoft.com/office/drawing/2014/main" id="{B15D2E43-4FD1-4EE6-A467-3329EA21AB10}"/>
-              </a:ext>
-            </a:extLst>
-          </p:cNvPr>
-          <p:cNvPicPr>
-            <a:picLocks noChangeAspect="1"/>
-          </p:cNvPicPr>
-          <p:nvPr/>
-        </p:nvPicPr>
-        <p:blipFill>
-          <a:blip r:embed="rId2"/>
-          <a:stretch>
-            <a:fillRect/>
-          </a:stretch>
-        </p:blipFill>
-        <p:spPr>
-          <a:xfrm>
-            <a:off x="2433637" y="823912"/>
-            <a:ext cx="7324725" cy="5210175"/>
-          </a:xfrm>
-          <a:prstGeom prst="rect">
-            <a:avLst/>
-          </a:prstGeom>
-        </p:spPr>
-      </p:pic>
-    </p:spTree>
-    <p:extLst>
-      <p:ext uri="{BB962C8B-B14F-4D97-AF65-F5344CB8AC3E}">
-        <p14:creationId xmlns:p14="http://schemas.microsoft.com/office/powerpoint/2010/main" val="3977797867"/>
-      </p:ext>
-    </p:extLst>
-  </p:cSld>
-  <p:clrMapOvr>
-    <a:masterClrMapping/>
-  </p:clrMapOvr>
-</p:sld>
-</file>
-
-<file path=ppt/slides/slide16.xml><?xml version="1.0" encoding="utf-8"?>
-<p:sld xmlns:a="http://schemas.openxmlformats.org/drawingml/2006/main" xmlns:r="http://schemas.openxmlformats.org/officeDocument/2006/relationships" xmlns:p="http://schemas.openxmlformats.org/presentationml/2006/main">
-  <p:cSld>
-    <p:spTree>
-      <p:nvGrpSpPr>
-        <p:cNvPr id="1" name=""/>
-        <p:cNvGrpSpPr/>
-        <p:nvPr/>
-      </p:nvGrpSpPr>
-      <p:grpSpPr>
-        <a:xfrm>
-          <a:off x="0" y="0"/>
-          <a:ext cx="0" cy="0"/>
-          <a:chOff x="0" y="0"/>
-          <a:chExt cx="0" cy="0"/>
-        </a:xfrm>
-      </p:grpSpPr>
-      <p:pic>
-        <p:nvPicPr>
-          <p:cNvPr id="3" name="Picture 2">
-            <a:extLst>
-              <a:ext uri="{FF2B5EF4-FFF2-40B4-BE49-F238E27FC236}">
-                <a16:creationId xmlns:a16="http://schemas.microsoft.com/office/drawing/2014/main" id="{2066692F-8704-4B89-8D53-8E90C911F57E}"/>
-              </a:ext>
-            </a:extLst>
-          </p:cNvPr>
-          <p:cNvPicPr>
-            <a:picLocks noChangeAspect="1"/>
-          </p:cNvPicPr>
-          <p:nvPr/>
-        </p:nvPicPr>
-        <p:blipFill>
-          <a:blip r:embed="rId2"/>
-          <a:stretch>
-            <a:fillRect/>
-          </a:stretch>
-        </p:blipFill>
-        <p:spPr>
-          <a:xfrm>
-            <a:off x="596397" y="1140890"/>
-            <a:ext cx="4772025" cy="733425"/>
-          </a:xfrm>
-          <a:prstGeom prst="rect">
-            <a:avLst/>
-          </a:prstGeom>
-        </p:spPr>
-      </p:pic>
-      <p:sp>
-        <p:nvSpPr>
-          <p:cNvPr id="5" name="TextBox 4">
-            <a:extLst>
-              <a:ext uri="{FF2B5EF4-FFF2-40B4-BE49-F238E27FC236}">
-                <a16:creationId xmlns:a16="http://schemas.microsoft.com/office/drawing/2014/main" id="{368A5710-04B7-4FC6-8B71-1D520325AF58}"/>
-              </a:ext>
-            </a:extLst>
-          </p:cNvPr>
-          <p:cNvSpPr txBox="1"/>
-          <p:nvPr/>
-        </p:nvSpPr>
-        <p:spPr>
-          <a:xfrm>
-            <a:off x="5173884" y="300942"/>
-            <a:ext cx="1788054" cy="369332"/>
-          </a:xfrm>
-          <a:prstGeom prst="rect">
-            <a:avLst/>
-          </a:prstGeom>
-          <a:noFill/>
-        </p:spPr>
-        <p:txBody>
-          <a:bodyPr wrap="none" rtlCol="0">
-            <a:spAutoFit/>
-          </a:bodyPr>
-          <a:lstStyle/>
-          <a:p>
-            <a:r>
-              <a:rPr lang="en-GB" dirty="0"/>
-              <a:t>Create superuser</a:t>
-            </a:r>
-            <a:endParaRPr lang="pt-PT" dirty="0"/>
-          </a:p>
-        </p:txBody>
-      </p:sp>
-      <p:pic>
-        <p:nvPicPr>
-          <p:cNvPr id="9" name="Picture 8">
-            <a:extLst>
-              <a:ext uri="{FF2B5EF4-FFF2-40B4-BE49-F238E27FC236}">
-                <a16:creationId xmlns:a16="http://schemas.microsoft.com/office/drawing/2014/main" id="{34FCAC73-EF03-49F0-A25A-D4501E771CC8}"/>
-              </a:ext>
-            </a:extLst>
-          </p:cNvPr>
-          <p:cNvPicPr>
-            <a:picLocks noChangeAspect="1"/>
-          </p:cNvPicPr>
-          <p:nvPr/>
-        </p:nvPicPr>
-        <p:blipFill>
-          <a:blip r:embed="rId3"/>
-          <a:stretch>
-            <a:fillRect/>
-          </a:stretch>
-        </p:blipFill>
-        <p:spPr>
-          <a:xfrm>
-            <a:off x="596397" y="2165912"/>
-            <a:ext cx="5067300" cy="1600200"/>
-          </a:xfrm>
-          <a:prstGeom prst="rect">
-            <a:avLst/>
-          </a:prstGeom>
-        </p:spPr>
-      </p:pic>
-      <p:sp>
-        <p:nvSpPr>
-          <p:cNvPr id="10" name="TextBox 9">
-            <a:extLst>
-              <a:ext uri="{FF2B5EF4-FFF2-40B4-BE49-F238E27FC236}">
-                <a16:creationId xmlns:a16="http://schemas.microsoft.com/office/drawing/2014/main" id="{6C29C340-9762-49DF-B576-EE93FE1616B6}"/>
-              </a:ext>
-            </a:extLst>
-          </p:cNvPr>
-          <p:cNvSpPr txBox="1"/>
-          <p:nvPr/>
-        </p:nvSpPr>
-        <p:spPr>
-          <a:xfrm>
-            <a:off x="1113100" y="4724400"/>
-            <a:ext cx="1711174" cy="369332"/>
-          </a:xfrm>
-          <a:prstGeom prst="rect">
-            <a:avLst/>
-          </a:prstGeom>
-          <a:noFill/>
-        </p:spPr>
-        <p:txBody>
-          <a:bodyPr wrap="none" rtlCol="0">
-            <a:spAutoFit/>
-          </a:bodyPr>
-          <a:lstStyle/>
-          <a:p>
-            <a:r>
-              <a:rPr lang="en-GB" dirty="0"/>
-              <a:t>Pw: </a:t>
-            </a:r>
-            <a:r>
-              <a:rPr lang="en-GB" dirty="0" err="1"/>
-              <a:t>dinewithme</a:t>
-            </a:r>
-            <a:endParaRPr lang="pt-PT" dirty="0"/>
-          </a:p>
-        </p:txBody>
-      </p:sp>
-    </p:spTree>
-    <p:extLst>
-      <p:ext uri="{BB962C8B-B14F-4D97-AF65-F5344CB8AC3E}">
-        <p14:creationId xmlns:p14="http://schemas.microsoft.com/office/powerpoint/2010/main" val="14937495"/>
       </p:ext>
     </p:extLst>
   </p:cSld>
@@ -17232,36 +15807,6 @@
           <a:chExt cx="0" cy="0"/>
         </a:xfrm>
       </p:grpSpPr>
-      <p:pic>
-        <p:nvPicPr>
-          <p:cNvPr id="3" name="Picture 2">
-            <a:extLst>
-              <a:ext uri="{FF2B5EF4-FFF2-40B4-BE49-F238E27FC236}">
-                <a16:creationId xmlns:a16="http://schemas.microsoft.com/office/drawing/2014/main" id="{4F1AE273-CB3A-49E7-A6F0-9185D8D6CDFF}"/>
-              </a:ext>
-            </a:extLst>
-          </p:cNvPr>
-          <p:cNvPicPr>
-            <a:picLocks noChangeAspect="1"/>
-          </p:cNvPicPr>
-          <p:nvPr/>
-        </p:nvPicPr>
-        <p:blipFill>
-          <a:blip r:embed="rId2"/>
-          <a:stretch>
-            <a:fillRect/>
-          </a:stretch>
-        </p:blipFill>
-        <p:spPr>
-          <a:xfrm>
-            <a:off x="2672648" y="1486016"/>
-            <a:ext cx="6846704" cy="3885968"/>
-          </a:xfrm>
-          <a:prstGeom prst="rect">
-            <a:avLst/>
-          </a:prstGeom>
-        </p:spPr>
-      </p:pic>
       <p:sp>
         <p:nvSpPr>
           <p:cNvPr id="4" name="TextBox 3">
@@ -17292,18 +15837,487 @@
           <a:p>
             <a:r>
               <a:rPr lang="en-GB" dirty="0"/>
-              <a:t>Database requirement assessment</a:t>
+              <a:t>Entity Relationship Diagrams</a:t>
             </a:r>
             <a:endParaRPr lang="pt-PT" dirty="0"/>
           </a:p>
         </p:txBody>
       </p:sp>
-      <p:sp>
-        <p:nvSpPr>
-          <p:cNvPr id="7" name="TextBox 6">
-            <a:extLst>
-              <a:ext uri="{FF2B5EF4-FFF2-40B4-BE49-F238E27FC236}">
-                <a16:creationId xmlns:a16="http://schemas.microsoft.com/office/drawing/2014/main" id="{FC98DAC8-6460-4CB6-97A0-882BE595AE77}"/>
+      <p:graphicFrame>
+        <p:nvGraphicFramePr>
+          <p:cNvPr id="5" name="Table 5">
+            <a:extLst>
+              <a:ext uri="{FF2B5EF4-FFF2-40B4-BE49-F238E27FC236}">
+                <a16:creationId xmlns:a16="http://schemas.microsoft.com/office/drawing/2014/main" id="{BC22AAFA-ADD2-42AE-9A2B-A23D22A2489C}"/>
+              </a:ext>
+            </a:extLst>
+          </p:cNvPr>
+          <p:cNvGraphicFramePr>
+            <a:graphicFrameLocks noGrp="1"/>
+          </p:cNvGraphicFramePr>
+          <p:nvPr>
+            <p:extLst>
+              <p:ext uri="{D42A27DB-BD31-4B8C-83A1-F6EECF244321}">
+                <p14:modId xmlns:p14="http://schemas.microsoft.com/office/powerpoint/2010/main" val="3772267809"/>
+              </p:ext>
+            </p:extLst>
+          </p:nvPr>
+        </p:nvGraphicFramePr>
+        <p:xfrm>
+          <a:off x="297337" y="1455617"/>
+          <a:ext cx="3916393" cy="3968888"/>
+        </p:xfrm>
+        <a:graphic>
+          <a:graphicData uri="http://schemas.openxmlformats.org/drawingml/2006/table">
+            <a:tbl>
+              <a:tblPr firstRow="1" bandRow="1">
+                <a:tableStyleId>{5C22544A-7EE6-4342-B048-85BDC9FD1C3A}</a:tableStyleId>
+              </a:tblPr>
+              <a:tblGrid>
+                <a:gridCol w="1043797">
+                  <a:extLst>
+                    <a:ext uri="{9D8B030D-6E8A-4147-A177-3AD203B41FA5}">
+                      <a16:colId xmlns:a16="http://schemas.microsoft.com/office/drawing/2014/main" val="3851660792"/>
+                    </a:ext>
+                  </a:extLst>
+                </a:gridCol>
+                <a:gridCol w="1587260">
+                  <a:extLst>
+                    <a:ext uri="{9D8B030D-6E8A-4147-A177-3AD203B41FA5}">
+                      <a16:colId xmlns:a16="http://schemas.microsoft.com/office/drawing/2014/main" val="1609101764"/>
+                    </a:ext>
+                  </a:extLst>
+                </a:gridCol>
+                <a:gridCol w="1285336">
+                  <a:extLst>
+                    <a:ext uri="{9D8B030D-6E8A-4147-A177-3AD203B41FA5}">
+                      <a16:colId xmlns:a16="http://schemas.microsoft.com/office/drawing/2014/main" val="2893061827"/>
+                    </a:ext>
+                  </a:extLst>
+                </a:gridCol>
+              </a:tblGrid>
+              <a:tr h="566984">
+                <a:tc>
+                  <a:txBody>
+                    <a:bodyPr/>
+                    <a:lstStyle/>
+                    <a:p>
+                      <a:pPr algn="ctr"/>
+                      <a:r>
+                        <a:rPr lang="en-GB" sz="1400" dirty="0"/>
+                        <a:t>Key</a:t>
+                      </a:r>
+                      <a:endParaRPr lang="pt-PT" sz="1400" dirty="0"/>
+                    </a:p>
+                  </a:txBody>
+                  <a:tcPr anchor="ctr"/>
+                </a:tc>
+                <a:tc>
+                  <a:txBody>
+                    <a:bodyPr/>
+                    <a:lstStyle/>
+                    <a:p>
+                      <a:pPr algn="ctr"/>
+                      <a:r>
+                        <a:rPr lang="en-GB" sz="1400" dirty="0"/>
+                        <a:t>Name</a:t>
+                      </a:r>
+                      <a:endParaRPr lang="pt-PT" sz="1400" dirty="0"/>
+                    </a:p>
+                  </a:txBody>
+                  <a:tcPr anchor="ctr"/>
+                </a:tc>
+                <a:tc>
+                  <a:txBody>
+                    <a:bodyPr/>
+                    <a:lstStyle/>
+                    <a:p>
+                      <a:pPr algn="ctr"/>
+                      <a:r>
+                        <a:rPr lang="en-GB" sz="1400" dirty="0"/>
+                        <a:t>Type</a:t>
+                      </a:r>
+                      <a:endParaRPr lang="pt-PT" sz="1400" dirty="0"/>
+                    </a:p>
+                  </a:txBody>
+                  <a:tcPr anchor="ctr"/>
+                </a:tc>
+                <a:extLst>
+                  <a:ext uri="{0D108BD9-81ED-4DB2-BD59-A6C34878D82A}">
+                    <a16:rowId xmlns:a16="http://schemas.microsoft.com/office/drawing/2014/main" val="3993183463"/>
+                  </a:ext>
+                </a:extLst>
+              </a:tr>
+              <a:tr h="566984">
+                <a:tc>
+                  <a:txBody>
+                    <a:bodyPr/>
+                    <a:lstStyle/>
+                    <a:p>
+                      <a:pPr algn="ctr"/>
+                      <a:r>
+                        <a:rPr lang="en-GB" sz="1400" dirty="0" err="1"/>
+                        <a:t>ForeignKey</a:t>
+                      </a:r>
+                      <a:endParaRPr lang="pt-PT" sz="1400" dirty="0"/>
+                    </a:p>
+                  </a:txBody>
+                  <a:tcPr anchor="ctr"/>
+                </a:tc>
+                <a:tc>
+                  <a:txBody>
+                    <a:bodyPr/>
+                    <a:lstStyle/>
+                    <a:p>
+                      <a:pPr algn="ctr"/>
+                      <a:r>
+                        <a:rPr lang="en-GB" sz="1400" dirty="0"/>
+                        <a:t>Username</a:t>
+                      </a:r>
+                      <a:endParaRPr lang="pt-PT" sz="1400" dirty="0"/>
+                    </a:p>
+                  </a:txBody>
+                  <a:tcPr anchor="ctr"/>
+                </a:tc>
+                <a:tc>
+                  <a:txBody>
+                    <a:bodyPr/>
+                    <a:lstStyle/>
+                    <a:p>
+                      <a:pPr algn="ctr"/>
+                      <a:r>
+                        <a:rPr lang="en-GB" sz="1400" dirty="0"/>
+                        <a:t>User Model</a:t>
+                      </a:r>
+                      <a:endParaRPr lang="pt-PT" sz="1400" dirty="0"/>
+                    </a:p>
+                  </a:txBody>
+                  <a:tcPr anchor="ctr"/>
+                </a:tc>
+                <a:extLst>
+                  <a:ext uri="{0D108BD9-81ED-4DB2-BD59-A6C34878D82A}">
+                    <a16:rowId xmlns:a16="http://schemas.microsoft.com/office/drawing/2014/main" val="4279462268"/>
+                  </a:ext>
+                </a:extLst>
+              </a:tr>
+              <a:tr h="566984">
+                <a:tc>
+                  <a:txBody>
+                    <a:bodyPr/>
+                    <a:lstStyle/>
+                    <a:p>
+                      <a:pPr algn="ctr"/>
+                      <a:endParaRPr lang="pt-PT" sz="1400" dirty="0"/>
+                    </a:p>
+                  </a:txBody>
+                  <a:tcPr anchor="ctr"/>
+                </a:tc>
+                <a:tc>
+                  <a:txBody>
+                    <a:bodyPr/>
+                    <a:lstStyle/>
+                    <a:p>
+                      <a:pPr algn="ctr"/>
+                      <a:r>
+                        <a:rPr lang="en-GB" sz="1400" dirty="0"/>
+                        <a:t>First Name</a:t>
+                      </a:r>
+                      <a:endParaRPr lang="pt-PT" sz="1400" dirty="0"/>
+                    </a:p>
+                  </a:txBody>
+                  <a:tcPr anchor="ctr"/>
+                </a:tc>
+                <a:tc>
+                  <a:txBody>
+                    <a:bodyPr/>
+                    <a:lstStyle/>
+                    <a:p>
+                      <a:pPr algn="ctr"/>
+                      <a:r>
+                        <a:rPr lang="en-GB" sz="1400" dirty="0" err="1"/>
+                        <a:t>CharField</a:t>
+                      </a:r>
+                      <a:endParaRPr lang="en-GB" sz="1400" dirty="0"/>
+                    </a:p>
+                    <a:p>
+                      <a:pPr algn="ctr"/>
+                      <a:r>
+                        <a:rPr lang="en-GB" sz="1400" dirty="0"/>
+                        <a:t>(max 80)</a:t>
+                      </a:r>
+                      <a:endParaRPr lang="pt-PT" sz="1400" dirty="0"/>
+                    </a:p>
+                  </a:txBody>
+                  <a:tcPr anchor="ctr"/>
+                </a:tc>
+                <a:extLst>
+                  <a:ext uri="{0D108BD9-81ED-4DB2-BD59-A6C34878D82A}">
+                    <a16:rowId xmlns:a16="http://schemas.microsoft.com/office/drawing/2014/main" val="1127955345"/>
+                  </a:ext>
+                </a:extLst>
+              </a:tr>
+              <a:tr h="566984">
+                <a:tc>
+                  <a:txBody>
+                    <a:bodyPr/>
+                    <a:lstStyle/>
+                    <a:p>
+                      <a:pPr algn="ctr"/>
+                      <a:endParaRPr lang="pt-PT" sz="1400" dirty="0"/>
+                    </a:p>
+                  </a:txBody>
+                  <a:tcPr anchor="ctr"/>
+                </a:tc>
+                <a:tc>
+                  <a:txBody>
+                    <a:bodyPr/>
+                    <a:lstStyle/>
+                    <a:p>
+                      <a:pPr algn="ctr"/>
+                      <a:r>
+                        <a:rPr lang="en-GB" sz="1400" dirty="0"/>
+                        <a:t>Last Name</a:t>
+                      </a:r>
+                      <a:endParaRPr lang="pt-PT" sz="1400" dirty="0"/>
+                    </a:p>
+                  </a:txBody>
+                  <a:tcPr anchor="ctr"/>
+                </a:tc>
+                <a:tc>
+                  <a:txBody>
+                    <a:bodyPr/>
+                    <a:lstStyle/>
+                    <a:p>
+                      <a:pPr algn="ctr"/>
+                      <a:r>
+                        <a:rPr lang="en-GB" sz="1400" dirty="0" err="1"/>
+                        <a:t>CharField</a:t>
+                      </a:r>
+                      <a:endParaRPr lang="en-GB" sz="1400" dirty="0"/>
+                    </a:p>
+                    <a:p>
+                      <a:pPr algn="ctr"/>
+                      <a:r>
+                        <a:rPr lang="en-GB" sz="1400" dirty="0"/>
+                        <a:t>(max 80)</a:t>
+                      </a:r>
+                      <a:endParaRPr lang="pt-PT" sz="1400" dirty="0"/>
+                    </a:p>
+                  </a:txBody>
+                  <a:tcPr anchor="ctr"/>
+                </a:tc>
+                <a:extLst>
+                  <a:ext uri="{0D108BD9-81ED-4DB2-BD59-A6C34878D82A}">
+                    <a16:rowId xmlns:a16="http://schemas.microsoft.com/office/drawing/2014/main" val="3745660415"/>
+                  </a:ext>
+                </a:extLst>
+              </a:tr>
+              <a:tr h="566984">
+                <a:tc>
+                  <a:txBody>
+                    <a:bodyPr/>
+                    <a:lstStyle/>
+                    <a:p>
+                      <a:pPr algn="ctr"/>
+                      <a:endParaRPr lang="pt-PT" sz="1400" dirty="0"/>
+                    </a:p>
+                  </a:txBody>
+                  <a:tcPr anchor="ctr"/>
+                </a:tc>
+                <a:tc>
+                  <a:txBody>
+                    <a:bodyPr/>
+                    <a:lstStyle/>
+                    <a:p>
+                      <a:pPr algn="ctr"/>
+                      <a:r>
+                        <a:rPr lang="en-GB" sz="1400" dirty="0"/>
+                        <a:t>Email(Unique)</a:t>
+                      </a:r>
+                      <a:endParaRPr lang="pt-PT" sz="1400" dirty="0"/>
+                    </a:p>
+                  </a:txBody>
+                  <a:tcPr anchor="ctr"/>
+                </a:tc>
+                <a:tc>
+                  <a:txBody>
+                    <a:bodyPr/>
+                    <a:lstStyle/>
+                    <a:p>
+                      <a:pPr marL="0" marR="0" lvl="0" indent="0" algn="ctr" defTabSz="914400" rtl="0" eaLnBrk="1" fontAlgn="auto" latinLnBrk="0" hangingPunct="1">
+                        <a:lnSpc>
+                          <a:spcPct val="100000"/>
+                        </a:lnSpc>
+                        <a:spcBef>
+                          <a:spcPts val="0"/>
+                        </a:spcBef>
+                        <a:spcAft>
+                          <a:spcPts val="0"/>
+                        </a:spcAft>
+                        <a:buClrTx/>
+                        <a:buSzTx/>
+                        <a:buFontTx/>
+                        <a:buNone/>
+                        <a:tabLst/>
+                        <a:defRPr/>
+                      </a:pPr>
+                      <a:r>
+                        <a:rPr lang="en-GB" sz="1400" dirty="0" err="1"/>
+                        <a:t>EmailField</a:t>
+                      </a:r>
+                      <a:r>
+                        <a:rPr lang="en-GB" sz="1400" dirty="0"/>
+                        <a:t>()</a:t>
+                      </a:r>
+                      <a:endParaRPr lang="pt-PT" sz="1400" dirty="0"/>
+                    </a:p>
+                  </a:txBody>
+                  <a:tcPr anchor="ctr"/>
+                </a:tc>
+                <a:extLst>
+                  <a:ext uri="{0D108BD9-81ED-4DB2-BD59-A6C34878D82A}">
+                    <a16:rowId xmlns:a16="http://schemas.microsoft.com/office/drawing/2014/main" val="39442062"/>
+                  </a:ext>
+                </a:extLst>
+              </a:tr>
+              <a:tr h="566984">
+                <a:tc>
+                  <a:txBody>
+                    <a:bodyPr/>
+                    <a:lstStyle/>
+                    <a:p>
+                      <a:pPr algn="ctr"/>
+                      <a:endParaRPr lang="pt-PT" sz="1400"/>
+                    </a:p>
+                  </a:txBody>
+                  <a:tcPr anchor="ctr"/>
+                </a:tc>
+                <a:tc>
+                  <a:txBody>
+                    <a:bodyPr/>
+                    <a:lstStyle/>
+                    <a:p>
+                      <a:pPr algn="ctr"/>
+                      <a:r>
+                        <a:rPr lang="en-GB" sz="1400" dirty="0"/>
+                        <a:t>Contact(Unique)</a:t>
+                      </a:r>
+                      <a:endParaRPr lang="pt-PT" sz="1400" dirty="0"/>
+                    </a:p>
+                  </a:txBody>
+                  <a:tcPr anchor="ctr"/>
+                </a:tc>
+                <a:tc>
+                  <a:txBody>
+                    <a:bodyPr/>
+                    <a:lstStyle/>
+                    <a:p>
+                      <a:pPr marL="0" marR="0" lvl="0" indent="0" algn="ctr" defTabSz="914400" rtl="0" eaLnBrk="1" fontAlgn="auto" latinLnBrk="0" hangingPunct="1">
+                        <a:lnSpc>
+                          <a:spcPct val="100000"/>
+                        </a:lnSpc>
+                        <a:spcBef>
+                          <a:spcPts val="0"/>
+                        </a:spcBef>
+                        <a:spcAft>
+                          <a:spcPts val="0"/>
+                        </a:spcAft>
+                        <a:buClrTx/>
+                        <a:buSzTx/>
+                        <a:buFontTx/>
+                        <a:buNone/>
+                        <a:tabLst/>
+                        <a:defRPr/>
+                      </a:pPr>
+                      <a:r>
+                        <a:rPr lang="en-GB" sz="1400" dirty="0" err="1"/>
+                        <a:t>IntField</a:t>
+                      </a:r>
+                      <a:endParaRPr lang="pt-PT" sz="1400" dirty="0"/>
+                    </a:p>
+                  </a:txBody>
+                  <a:tcPr anchor="ctr"/>
+                </a:tc>
+                <a:extLst>
+                  <a:ext uri="{0D108BD9-81ED-4DB2-BD59-A6C34878D82A}">
+                    <a16:rowId xmlns:a16="http://schemas.microsoft.com/office/drawing/2014/main" val="3880644178"/>
+                  </a:ext>
+                </a:extLst>
+              </a:tr>
+              <a:tr h="566984">
+                <a:tc>
+                  <a:txBody>
+                    <a:bodyPr/>
+                    <a:lstStyle/>
+                    <a:p>
+                      <a:pPr algn="ctr"/>
+                      <a:endParaRPr lang="pt-PT" sz="1400" dirty="0"/>
+                    </a:p>
+                  </a:txBody>
+                  <a:tcPr anchor="ctr"/>
+                </a:tc>
+                <a:tc>
+                  <a:txBody>
+                    <a:bodyPr/>
+                    <a:lstStyle/>
+                    <a:p>
+                      <a:pPr algn="ctr"/>
+                      <a:r>
+                        <a:rPr lang="en-GB" sz="1400" dirty="0"/>
+                        <a:t>Slug(Unique)</a:t>
+                      </a:r>
+                      <a:endParaRPr lang="pt-PT" sz="1400" dirty="0"/>
+                    </a:p>
+                  </a:txBody>
+                  <a:tcPr anchor="ctr"/>
+                </a:tc>
+                <a:tc>
+                  <a:txBody>
+                    <a:bodyPr/>
+                    <a:lstStyle/>
+                    <a:p>
+                      <a:pPr marL="0" marR="0" lvl="0" indent="0" algn="ctr" defTabSz="914400" rtl="0" eaLnBrk="1" fontAlgn="auto" latinLnBrk="0" hangingPunct="1">
+                        <a:lnSpc>
+                          <a:spcPct val="100000"/>
+                        </a:lnSpc>
+                        <a:spcBef>
+                          <a:spcPts val="0"/>
+                        </a:spcBef>
+                        <a:spcAft>
+                          <a:spcPts val="0"/>
+                        </a:spcAft>
+                        <a:buClrTx/>
+                        <a:buSzTx/>
+                        <a:buFontTx/>
+                        <a:buNone/>
+                        <a:tabLst/>
+                        <a:defRPr/>
+                      </a:pPr>
+                      <a:r>
+                        <a:rPr lang="en-GB" sz="1400" dirty="0" err="1"/>
+                        <a:t>SlugField</a:t>
+                      </a:r>
+                      <a:endParaRPr lang="pt-PT" sz="1400" dirty="0"/>
+                    </a:p>
+                  </a:txBody>
+                  <a:tcPr anchor="ctr"/>
+                </a:tc>
+                <a:extLst>
+                  <a:ext uri="{0D108BD9-81ED-4DB2-BD59-A6C34878D82A}">
+                    <a16:rowId xmlns:a16="http://schemas.microsoft.com/office/drawing/2014/main" val="2450656954"/>
+                  </a:ext>
+                </a:extLst>
+              </a:tr>
+            </a:tbl>
+          </a:graphicData>
+        </a:graphic>
+      </p:graphicFrame>
+      <p:sp>
+        <p:nvSpPr>
+          <p:cNvPr id="6" name="TextBox 5">
+            <a:extLst>
+              <a:ext uri="{FF2B5EF4-FFF2-40B4-BE49-F238E27FC236}">
+                <a16:creationId xmlns:a16="http://schemas.microsoft.com/office/drawing/2014/main" id="{01B5D212-31DF-40CA-9F8E-A15E5ED87D67}"/>
               </a:ext>
             </a:extLst>
           </p:cNvPr>
@@ -17312,8 +16326,8 @@
         </p:nvSpPr>
         <p:spPr>
           <a:xfrm>
-            <a:off x="3756802" y="945728"/>
-            <a:ext cx="4678394" cy="369332"/>
+            <a:off x="8059294" y="830674"/>
+            <a:ext cx="2580019" cy="369332"/>
           </a:xfrm>
           <a:prstGeom prst="rect">
             <a:avLst/>
@@ -17328,15 +16342,572 @@
           <a:p>
             <a:r>
               <a:rPr lang="en-GB" dirty="0"/>
-              <a:t>Home Page – No </a:t>
-            </a:r>
-            <a:r>
-              <a:rPr lang="en-GB" dirty="0" err="1"/>
-              <a:t>db</a:t>
-            </a:r>
+              <a:t>Table – 2 seats per table</a:t>
+            </a:r>
+            <a:endParaRPr lang="pt-PT" dirty="0"/>
+          </a:p>
+        </p:txBody>
+      </p:sp>
+      <p:graphicFrame>
+        <p:nvGraphicFramePr>
+          <p:cNvPr id="8" name="Table 5">
+            <a:extLst>
+              <a:ext uri="{FF2B5EF4-FFF2-40B4-BE49-F238E27FC236}">
+                <a16:creationId xmlns:a16="http://schemas.microsoft.com/office/drawing/2014/main" id="{2F95D9A3-F653-4A0F-BAA6-40A591D5530A}"/>
+              </a:ext>
+            </a:extLst>
+          </p:cNvPr>
+          <p:cNvGraphicFramePr>
+            <a:graphicFrameLocks noGrp="1"/>
+          </p:cNvGraphicFramePr>
+          <p:nvPr>
+            <p:extLst>
+              <p:ext uri="{D42A27DB-BD31-4B8C-83A1-F6EECF244321}">
+                <p14:modId xmlns:p14="http://schemas.microsoft.com/office/powerpoint/2010/main" val="9676373"/>
+              </p:ext>
+            </p:extLst>
+          </p:nvPr>
+        </p:nvGraphicFramePr>
+        <p:xfrm>
+          <a:off x="7391108" y="1455617"/>
+          <a:ext cx="3968151" cy="2560975"/>
+        </p:xfrm>
+        <a:graphic>
+          <a:graphicData uri="http://schemas.openxmlformats.org/drawingml/2006/table">
+            <a:tbl>
+              <a:tblPr firstRow="1" bandRow="1">
+                <a:tableStyleId>{5C22544A-7EE6-4342-B048-85BDC9FD1C3A}</a:tableStyleId>
+              </a:tblPr>
+              <a:tblGrid>
+                <a:gridCol w="1026544">
+                  <a:extLst>
+                    <a:ext uri="{9D8B030D-6E8A-4147-A177-3AD203B41FA5}">
+                      <a16:colId xmlns:a16="http://schemas.microsoft.com/office/drawing/2014/main" val="3851660792"/>
+                    </a:ext>
+                  </a:extLst>
+                </a:gridCol>
+                <a:gridCol w="862641">
+                  <a:extLst>
+                    <a:ext uri="{9D8B030D-6E8A-4147-A177-3AD203B41FA5}">
+                      <a16:colId xmlns:a16="http://schemas.microsoft.com/office/drawing/2014/main" val="1609101764"/>
+                    </a:ext>
+                  </a:extLst>
+                </a:gridCol>
+                <a:gridCol w="2078966">
+                  <a:extLst>
+                    <a:ext uri="{9D8B030D-6E8A-4147-A177-3AD203B41FA5}">
+                      <a16:colId xmlns:a16="http://schemas.microsoft.com/office/drawing/2014/main" val="2893061827"/>
+                    </a:ext>
+                  </a:extLst>
+                </a:gridCol>
+              </a:tblGrid>
+              <a:tr h="388920">
+                <a:tc>
+                  <a:txBody>
+                    <a:bodyPr/>
+                    <a:lstStyle/>
+                    <a:p>
+                      <a:pPr algn="ctr"/>
+                      <a:r>
+                        <a:rPr lang="en-GB" sz="1400" dirty="0"/>
+                        <a:t>Key</a:t>
+                      </a:r>
+                      <a:endParaRPr lang="pt-PT" sz="1400" dirty="0"/>
+                    </a:p>
+                  </a:txBody>
+                  <a:tcPr anchor="ctr"/>
+                </a:tc>
+                <a:tc>
+                  <a:txBody>
+                    <a:bodyPr/>
+                    <a:lstStyle/>
+                    <a:p>
+                      <a:pPr algn="ctr"/>
+                      <a:r>
+                        <a:rPr lang="en-GB" sz="1400" dirty="0"/>
+                        <a:t>Name</a:t>
+                      </a:r>
+                      <a:endParaRPr lang="pt-PT" sz="1400" dirty="0"/>
+                    </a:p>
+                  </a:txBody>
+                  <a:tcPr anchor="ctr"/>
+                </a:tc>
+                <a:tc>
+                  <a:txBody>
+                    <a:bodyPr/>
+                    <a:lstStyle/>
+                    <a:p>
+                      <a:pPr algn="ctr"/>
+                      <a:r>
+                        <a:rPr lang="en-GB" sz="1400" dirty="0"/>
+                        <a:t>Type</a:t>
+                      </a:r>
+                      <a:endParaRPr lang="pt-PT" sz="1400" dirty="0"/>
+                    </a:p>
+                  </a:txBody>
+                  <a:tcPr anchor="ctr"/>
+                </a:tc>
+                <a:extLst>
+                  <a:ext uri="{0D108BD9-81ED-4DB2-BD59-A6C34878D82A}">
+                    <a16:rowId xmlns:a16="http://schemas.microsoft.com/office/drawing/2014/main" val="3993183463"/>
+                  </a:ext>
+                </a:extLst>
+              </a:tr>
+              <a:tr h="434411">
+                <a:tc>
+                  <a:txBody>
+                    <a:bodyPr/>
+                    <a:lstStyle/>
+                    <a:p>
+                      <a:pPr marL="0" marR="0" lvl="0" indent="0" algn="ctr" defTabSz="914400" rtl="0" eaLnBrk="1" fontAlgn="auto" latinLnBrk="0" hangingPunct="1">
+                        <a:lnSpc>
+                          <a:spcPct val="100000"/>
+                        </a:lnSpc>
+                        <a:spcBef>
+                          <a:spcPts val="0"/>
+                        </a:spcBef>
+                        <a:spcAft>
+                          <a:spcPts val="0"/>
+                        </a:spcAft>
+                        <a:buClrTx/>
+                        <a:buSzTx/>
+                        <a:buFontTx/>
+                        <a:buNone/>
+                        <a:tabLst/>
+                        <a:defRPr/>
+                      </a:pPr>
+                      <a:r>
+                        <a:rPr lang="en-GB" sz="1400" dirty="0" err="1"/>
+                        <a:t>ForeignKey</a:t>
+                      </a:r>
+                      <a:endParaRPr lang="pt-PT" sz="1400" dirty="0"/>
+                    </a:p>
+                  </a:txBody>
+                  <a:tcPr anchor="ctr"/>
+                </a:tc>
+                <a:tc>
+                  <a:txBody>
+                    <a:bodyPr/>
+                    <a:lstStyle/>
+                    <a:p>
+                      <a:pPr algn="ctr"/>
+                      <a:r>
+                        <a:rPr lang="en-GB" sz="1400" dirty="0"/>
+                        <a:t>Table</a:t>
+                      </a:r>
+                      <a:endParaRPr lang="pt-PT" sz="1400" dirty="0"/>
+                    </a:p>
+                  </a:txBody>
+                  <a:tcPr anchor="ctr"/>
+                </a:tc>
+                <a:tc>
+                  <a:txBody>
+                    <a:bodyPr/>
+                    <a:lstStyle/>
+                    <a:p>
+                      <a:pPr algn="ctr"/>
+                      <a:r>
+                        <a:rPr lang="en-GB" sz="1400" dirty="0" err="1"/>
+                        <a:t>IntegerField</a:t>
+                      </a:r>
+                      <a:r>
+                        <a:rPr lang="en-GB" sz="1400" dirty="0"/>
+                        <a:t>()</a:t>
+                      </a:r>
+                      <a:endParaRPr lang="pt-PT" sz="1400" dirty="0"/>
+                    </a:p>
+                  </a:txBody>
+                  <a:tcPr anchor="ctr"/>
+                </a:tc>
+                <a:extLst>
+                  <a:ext uri="{0D108BD9-81ED-4DB2-BD59-A6C34878D82A}">
+                    <a16:rowId xmlns:a16="http://schemas.microsoft.com/office/drawing/2014/main" val="4279462268"/>
+                  </a:ext>
+                </a:extLst>
+              </a:tr>
+              <a:tr h="434411">
+                <a:tc>
+                  <a:txBody>
+                    <a:bodyPr/>
+                    <a:lstStyle/>
+                    <a:p>
+                      <a:pPr marL="0" marR="0" lvl="0" indent="0" algn="ctr" defTabSz="914400" rtl="0" eaLnBrk="1" fontAlgn="auto" latinLnBrk="0" hangingPunct="1">
+                        <a:lnSpc>
+                          <a:spcPct val="100000"/>
+                        </a:lnSpc>
+                        <a:spcBef>
+                          <a:spcPts val="0"/>
+                        </a:spcBef>
+                        <a:spcAft>
+                          <a:spcPts val="0"/>
+                        </a:spcAft>
+                        <a:buClrTx/>
+                        <a:buSzTx/>
+                        <a:buFontTx/>
+                        <a:buNone/>
+                        <a:tabLst/>
+                        <a:defRPr/>
+                      </a:pPr>
+                      <a:endParaRPr lang="pt-PT" sz="1400" dirty="0"/>
+                    </a:p>
+                  </a:txBody>
+                  <a:tcPr anchor="ctr"/>
+                </a:tc>
+                <a:tc>
+                  <a:txBody>
+                    <a:bodyPr/>
+                    <a:lstStyle/>
+                    <a:p>
+                      <a:pPr marL="0" marR="0" lvl="0" indent="0" algn="ctr" defTabSz="914400" rtl="0" eaLnBrk="1" fontAlgn="auto" latinLnBrk="0" hangingPunct="1">
+                        <a:lnSpc>
+                          <a:spcPct val="100000"/>
+                        </a:lnSpc>
+                        <a:spcBef>
+                          <a:spcPts val="0"/>
+                        </a:spcBef>
+                        <a:spcAft>
+                          <a:spcPts val="0"/>
+                        </a:spcAft>
+                        <a:buClrTx/>
+                        <a:buSzTx/>
+                        <a:buFontTx/>
+                        <a:buNone/>
+                        <a:tabLst/>
+                        <a:defRPr/>
+                      </a:pPr>
+                      <a:r>
+                        <a:rPr lang="en-GB" sz="1400" dirty="0"/>
+                        <a:t>Number</a:t>
+                      </a:r>
+                      <a:endParaRPr lang="pt-PT" sz="1400" dirty="0"/>
+                    </a:p>
+                  </a:txBody>
+                  <a:tcPr anchor="ctr"/>
+                </a:tc>
+                <a:tc>
+                  <a:txBody>
+                    <a:bodyPr/>
+                    <a:lstStyle/>
+                    <a:p>
+                      <a:pPr marL="0" marR="0" lvl="0" indent="0" algn="ctr" defTabSz="914400" rtl="0" eaLnBrk="1" fontAlgn="auto" latinLnBrk="0" hangingPunct="1">
+                        <a:lnSpc>
+                          <a:spcPct val="100000"/>
+                        </a:lnSpc>
+                        <a:spcBef>
+                          <a:spcPts val="0"/>
+                        </a:spcBef>
+                        <a:spcAft>
+                          <a:spcPts val="0"/>
+                        </a:spcAft>
+                        <a:buClrTx/>
+                        <a:buSzTx/>
+                        <a:buFontTx/>
+                        <a:buNone/>
+                        <a:tabLst/>
+                        <a:defRPr/>
+                      </a:pPr>
+                      <a:r>
+                        <a:rPr lang="en-GB" sz="1400" dirty="0" err="1"/>
+                        <a:t>IntegerField</a:t>
+                      </a:r>
+                      <a:r>
+                        <a:rPr lang="en-GB" sz="1400" dirty="0"/>
+                        <a:t>()</a:t>
+                      </a:r>
+                      <a:endParaRPr lang="pt-PT" sz="1400" dirty="0"/>
+                    </a:p>
+                  </a:txBody>
+                  <a:tcPr anchor="ctr"/>
+                </a:tc>
+                <a:extLst>
+                  <a:ext uri="{0D108BD9-81ED-4DB2-BD59-A6C34878D82A}">
+                    <a16:rowId xmlns:a16="http://schemas.microsoft.com/office/drawing/2014/main" val="1041435757"/>
+                  </a:ext>
+                </a:extLst>
+              </a:tr>
+              <a:tr h="434411">
+                <a:tc>
+                  <a:txBody>
+                    <a:bodyPr/>
+                    <a:lstStyle/>
+                    <a:p>
+                      <a:pPr marL="0" marR="0" lvl="0" indent="0" algn="ctr" defTabSz="914400" rtl="0" eaLnBrk="1" fontAlgn="auto" latinLnBrk="0" hangingPunct="1">
+                        <a:lnSpc>
+                          <a:spcPct val="100000"/>
+                        </a:lnSpc>
+                        <a:spcBef>
+                          <a:spcPts val="0"/>
+                        </a:spcBef>
+                        <a:spcAft>
+                          <a:spcPts val="0"/>
+                        </a:spcAft>
+                        <a:buClrTx/>
+                        <a:buSzTx/>
+                        <a:buFontTx/>
+                        <a:buNone/>
+                        <a:tabLst/>
+                        <a:defRPr/>
+                      </a:pPr>
+                      <a:endParaRPr lang="pt-PT" sz="1400" dirty="0"/>
+                    </a:p>
+                  </a:txBody>
+                  <a:tcPr anchor="ctr"/>
+                </a:tc>
+                <a:tc>
+                  <a:txBody>
+                    <a:bodyPr/>
+                    <a:lstStyle/>
+                    <a:p>
+                      <a:pPr algn="ctr"/>
+                      <a:r>
+                        <a:rPr lang="en-GB" sz="1400" dirty="0"/>
+                        <a:t>Location</a:t>
+                      </a:r>
+                      <a:endParaRPr lang="pt-PT" sz="1400" dirty="0"/>
+                    </a:p>
+                  </a:txBody>
+                  <a:tcPr anchor="ctr"/>
+                </a:tc>
+                <a:tc>
+                  <a:txBody>
+                    <a:bodyPr/>
+                    <a:lstStyle/>
+                    <a:p>
+                      <a:pPr marL="0" marR="0" lvl="0" indent="0" algn="ctr" defTabSz="914400" rtl="0" eaLnBrk="1" fontAlgn="auto" latinLnBrk="0" hangingPunct="1">
+                        <a:lnSpc>
+                          <a:spcPct val="100000"/>
+                        </a:lnSpc>
+                        <a:spcBef>
+                          <a:spcPts val="0"/>
+                        </a:spcBef>
+                        <a:spcAft>
+                          <a:spcPts val="0"/>
+                        </a:spcAft>
+                        <a:buClrTx/>
+                        <a:buSzTx/>
+                        <a:buFontTx/>
+                        <a:buNone/>
+                        <a:tabLst/>
+                        <a:defRPr/>
+                      </a:pPr>
+                      <a:r>
+                        <a:rPr lang="en-GB" sz="1400" dirty="0" err="1"/>
+                        <a:t>Charfield</a:t>
+                      </a:r>
+                      <a:endParaRPr lang="pt-PT" sz="1400" dirty="0"/>
+                    </a:p>
+                  </a:txBody>
+                  <a:tcPr anchor="ctr"/>
+                </a:tc>
+                <a:extLst>
+                  <a:ext uri="{0D108BD9-81ED-4DB2-BD59-A6C34878D82A}">
+                    <a16:rowId xmlns:a16="http://schemas.microsoft.com/office/drawing/2014/main" val="2166473133"/>
+                  </a:ext>
+                </a:extLst>
+              </a:tr>
+              <a:tr h="434411">
+                <a:tc>
+                  <a:txBody>
+                    <a:bodyPr/>
+                    <a:lstStyle/>
+                    <a:p>
+                      <a:pPr marL="0" marR="0" lvl="0" indent="0" algn="ctr" defTabSz="914400" rtl="0" eaLnBrk="1" fontAlgn="auto" latinLnBrk="0" hangingPunct="1">
+                        <a:lnSpc>
+                          <a:spcPct val="100000"/>
+                        </a:lnSpc>
+                        <a:spcBef>
+                          <a:spcPts val="0"/>
+                        </a:spcBef>
+                        <a:spcAft>
+                          <a:spcPts val="0"/>
+                        </a:spcAft>
+                        <a:buClrTx/>
+                        <a:buSzTx/>
+                        <a:buFontTx/>
+                        <a:buNone/>
+                        <a:tabLst/>
+                        <a:defRPr/>
+                      </a:pPr>
+                      <a:endParaRPr lang="pt-PT" sz="1400" dirty="0"/>
+                    </a:p>
+                  </a:txBody>
+                  <a:tcPr anchor="ctr"/>
+                </a:tc>
+                <a:tc>
+                  <a:txBody>
+                    <a:bodyPr/>
+                    <a:lstStyle/>
+                    <a:p>
+                      <a:pPr algn="ctr"/>
+                      <a:r>
+                        <a:rPr lang="en-GB" sz="1400" dirty="0"/>
+                        <a:t>Capacity</a:t>
+                      </a:r>
+                      <a:endParaRPr lang="pt-PT" sz="1400" dirty="0"/>
+                    </a:p>
+                  </a:txBody>
+                  <a:tcPr anchor="ctr"/>
+                </a:tc>
+                <a:tc>
+                  <a:txBody>
+                    <a:bodyPr/>
+                    <a:lstStyle/>
+                    <a:p>
+                      <a:pPr marL="0" marR="0" lvl="0" indent="0" algn="ctr" defTabSz="914400" rtl="0" eaLnBrk="1" fontAlgn="auto" latinLnBrk="0" hangingPunct="1">
+                        <a:lnSpc>
+                          <a:spcPct val="100000"/>
+                        </a:lnSpc>
+                        <a:spcBef>
+                          <a:spcPts val="0"/>
+                        </a:spcBef>
+                        <a:spcAft>
+                          <a:spcPts val="0"/>
+                        </a:spcAft>
+                        <a:buClrTx/>
+                        <a:buSzTx/>
+                        <a:buFontTx/>
+                        <a:buNone/>
+                        <a:tabLst/>
+                        <a:defRPr/>
+                      </a:pPr>
+                      <a:r>
+                        <a:rPr lang="en-GB" sz="1400" dirty="0" err="1"/>
+                        <a:t>IntegerField</a:t>
+                      </a:r>
+                      <a:r>
+                        <a:rPr lang="en-GB" sz="1400" dirty="0"/>
+                        <a:t>()</a:t>
+                      </a:r>
+                      <a:endParaRPr lang="pt-PT" sz="1400" dirty="0"/>
+                    </a:p>
+                  </a:txBody>
+                  <a:tcPr anchor="ctr"/>
+                </a:tc>
+                <a:extLst>
+                  <a:ext uri="{0D108BD9-81ED-4DB2-BD59-A6C34878D82A}">
+                    <a16:rowId xmlns:a16="http://schemas.microsoft.com/office/drawing/2014/main" val="930263335"/>
+                  </a:ext>
+                </a:extLst>
+              </a:tr>
+              <a:tr h="434411">
+                <a:tc>
+                  <a:txBody>
+                    <a:bodyPr/>
+                    <a:lstStyle/>
+                    <a:p>
+                      <a:pPr marL="0" marR="0" lvl="0" indent="0" algn="ctr" defTabSz="914400" rtl="0" eaLnBrk="1" fontAlgn="auto" latinLnBrk="0" hangingPunct="1">
+                        <a:lnSpc>
+                          <a:spcPct val="100000"/>
+                        </a:lnSpc>
+                        <a:spcBef>
+                          <a:spcPts val="0"/>
+                        </a:spcBef>
+                        <a:spcAft>
+                          <a:spcPts val="0"/>
+                        </a:spcAft>
+                        <a:buClrTx/>
+                        <a:buSzTx/>
+                        <a:buFontTx/>
+                        <a:buNone/>
+                        <a:tabLst/>
+                        <a:defRPr/>
+                      </a:pPr>
+                      <a:endParaRPr lang="pt-PT" sz="1400" dirty="0"/>
+                    </a:p>
+                  </a:txBody>
+                  <a:tcPr anchor="ctr"/>
+                </a:tc>
+                <a:tc>
+                  <a:txBody>
+                    <a:bodyPr/>
+                    <a:lstStyle/>
+                    <a:p>
+                      <a:pPr algn="ctr"/>
+                      <a:r>
+                        <a:rPr lang="en-GB" sz="1400" dirty="0"/>
+                        <a:t>Status</a:t>
+                      </a:r>
+                      <a:endParaRPr lang="pt-PT" sz="1400" dirty="0"/>
+                    </a:p>
+                  </a:txBody>
+                  <a:tcPr anchor="ctr"/>
+                </a:tc>
+                <a:tc>
+                  <a:txBody>
+                    <a:bodyPr/>
+                    <a:lstStyle/>
+                    <a:p>
+                      <a:pPr marL="0" marR="0" lvl="0" indent="0" algn="ctr" defTabSz="914400" rtl="0" eaLnBrk="1" fontAlgn="auto" latinLnBrk="0" hangingPunct="1">
+                        <a:lnSpc>
+                          <a:spcPct val="100000"/>
+                        </a:lnSpc>
+                        <a:spcBef>
+                          <a:spcPts val="0"/>
+                        </a:spcBef>
+                        <a:spcAft>
+                          <a:spcPts val="0"/>
+                        </a:spcAft>
+                        <a:buClrTx/>
+                        <a:buSzTx/>
+                        <a:buFontTx/>
+                        <a:buNone/>
+                        <a:tabLst/>
+                        <a:defRPr/>
+                      </a:pPr>
+                      <a:r>
+                        <a:rPr lang="en-GB" sz="1400" dirty="0" err="1"/>
+                        <a:t>IntegerField</a:t>
+                      </a:r>
+                      <a:r>
+                        <a:rPr lang="en-GB" sz="1400" dirty="0"/>
+                        <a:t>()</a:t>
+                      </a:r>
+                      <a:endParaRPr lang="pt-PT" sz="1400" dirty="0"/>
+                    </a:p>
+                  </a:txBody>
+                  <a:tcPr anchor="ctr"/>
+                </a:tc>
+                <a:extLst>
+                  <a:ext uri="{0D108BD9-81ED-4DB2-BD59-A6C34878D82A}">
+                    <a16:rowId xmlns:a16="http://schemas.microsoft.com/office/drawing/2014/main" val="872706194"/>
+                  </a:ext>
+                </a:extLst>
+              </a:tr>
+            </a:tbl>
+          </a:graphicData>
+        </a:graphic>
+      </p:graphicFrame>
+      <p:sp>
+        <p:nvSpPr>
+          <p:cNvPr id="9" name="TextBox 8">
+            <a:extLst>
+              <a:ext uri="{FF2B5EF4-FFF2-40B4-BE49-F238E27FC236}">
+                <a16:creationId xmlns:a16="http://schemas.microsoft.com/office/drawing/2014/main" id="{63451A3B-C741-4B50-B079-D043AC748AC4}"/>
+              </a:ext>
+            </a:extLst>
+          </p:cNvPr>
+          <p:cNvSpPr txBox="1"/>
+          <p:nvPr/>
+        </p:nvSpPr>
+        <p:spPr>
+          <a:xfrm>
+            <a:off x="977511" y="821028"/>
+            <a:ext cx="2580019" cy="369332"/>
+          </a:xfrm>
+          <a:prstGeom prst="rect">
+            <a:avLst/>
+          </a:prstGeom>
+          <a:noFill/>
+        </p:spPr>
+        <p:txBody>
+          <a:bodyPr wrap="square" rtlCol="0">
+            <a:spAutoFit/>
+          </a:bodyPr>
+          <a:lstStyle/>
+          <a:p>
             <a:r>
               <a:rPr lang="en-GB" dirty="0"/>
-              <a:t> required(Just HTML &amp; CSS)</a:t>
+              <a:t>User Model</a:t>
             </a:r>
             <a:endParaRPr lang="pt-PT" dirty="0"/>
           </a:p>
@@ -17345,7 +16916,7 @@
     </p:spTree>
     <p:extLst>
       <p:ext uri="{BB962C8B-B14F-4D97-AF65-F5344CB8AC3E}">
-        <p14:creationId xmlns:p14="http://schemas.microsoft.com/office/powerpoint/2010/main" val="698011910"/>
+        <p14:creationId xmlns:p14="http://schemas.microsoft.com/office/powerpoint/2010/main" val="2337255865"/>
       </p:ext>
     </p:extLst>
   </p:cSld>

</xml_diff>